<commit_message>
Adicionado mais um slide de conceito
</commit_message>
<xml_diff>
--- a/4 - modelo linguagem em pt/leitura/language_models_are_unsupervised_multitask_learners.pptx
+++ b/4 - modelo linguagem em pt/leitura/language_models_are_unsupervised_multitask_learners.pptx
@@ -5,17 +5,18 @@
     <p:sldMasterId id="2147483648" r:id="rId4"/>
   </p:sldMasterIdLst>
   <p:notesMasterIdLst>
-    <p:notesMasterId r:id="rId10"/>
+    <p:notesMasterId r:id="rId11"/>
   </p:notesMasterIdLst>
   <p:handoutMasterIdLst>
-    <p:handoutMasterId r:id="rId11"/>
+    <p:handoutMasterId r:id="rId12"/>
   </p:handoutMasterIdLst>
   <p:sldIdLst>
     <p:sldId id="256" r:id="rId5"/>
     <p:sldId id="298" r:id="rId6"/>
     <p:sldId id="303" r:id="rId7"/>
-    <p:sldId id="277" r:id="rId8"/>
-    <p:sldId id="289" r:id="rId9"/>
+    <p:sldId id="304" r:id="rId8"/>
+    <p:sldId id="277" r:id="rId9"/>
+    <p:sldId id="289" r:id="rId10"/>
   </p:sldIdLst>
   <p:sldSz cx="12192000" cy="6858000"/>
   <p:notesSz cx="6858000" cy="9144000"/>
@@ -233,7 +234,7 @@
             <a:pPr rtl="0"/>
             <a:fld id="{1CFE3099-591D-45A7-A51D-7A26F574396C}" type="datetime1">
               <a:rPr lang="pt-BR" smtClean="0"/>
-              <a:t>28/03/2023</a:t>
+              <a:t>29/03/2023</a:t>
             </a:fld>
             <a:endParaRPr lang="pt-BR" dirty="0"/>
           </a:p>
@@ -414,7 +415,7 @@
             <a:fld id="{04512B0B-086E-405E-B6A3-A336C302B6B7}" type="datetime1">
               <a:rPr lang="pt-BR" smtClean="0"/>
               <a:pPr/>
-              <a:t>28/03/2023</a:t>
+              <a:t>29/03/2023</a:t>
             </a:fld>
             <a:endParaRPr lang="pt-BR" dirty="0"/>
           </a:p>
@@ -1015,7 +1016,7 @@
     </p:spTree>
     <p:extLst>
       <p:ext uri="{BB962C8B-B14F-4D97-AF65-F5344CB8AC3E}">
-        <p14:creationId xmlns:p14="http://schemas.microsoft.com/office/powerpoint/2010/main" val="4172674702"/>
+        <p14:creationId xmlns:p14="http://schemas.microsoft.com/office/powerpoint/2010/main" val="2353825951"/>
       </p:ext>
     </p:extLst>
   </p:cSld>
@@ -1092,6 +1093,91 @@
             <a:fld id="{35BAF473-2665-42A7-89E3-C7BA7EB58D12}" type="slidenum">
               <a:rPr lang="pt-BR" smtClean="0"/>
               <a:t>5</a:t>
+            </a:fld>
+            <a:endParaRPr lang="pt-BR"/>
+          </a:p>
+        </p:txBody>
+      </p:sp>
+    </p:spTree>
+    <p:extLst>
+      <p:ext uri="{BB962C8B-B14F-4D97-AF65-F5344CB8AC3E}">
+        <p14:creationId xmlns:p14="http://schemas.microsoft.com/office/powerpoint/2010/main" val="4172674702"/>
+      </p:ext>
+    </p:extLst>
+  </p:cSld>
+  <p:clrMapOvr>
+    <a:masterClrMapping/>
+  </p:clrMapOvr>
+</p:notes>
+</file>
+
+<file path=ppt/notesSlides/notesSlide6.xml><?xml version="1.0" encoding="utf-8"?>
+<p:notes xmlns:a="http://schemas.openxmlformats.org/drawingml/2006/main" xmlns:r="http://schemas.openxmlformats.org/officeDocument/2006/relationships" xmlns:p="http://schemas.openxmlformats.org/presentationml/2006/main">
+  <p:cSld>
+    <p:spTree>
+      <p:nvGrpSpPr>
+        <p:cNvPr id="1" name=""/>
+        <p:cNvGrpSpPr/>
+        <p:nvPr/>
+      </p:nvGrpSpPr>
+      <p:grpSpPr>
+        <a:xfrm>
+          <a:off x="0" y="0"/>
+          <a:ext cx="0" cy="0"/>
+          <a:chOff x="0" y="0"/>
+          <a:chExt cx="0" cy="0"/>
+        </a:xfrm>
+      </p:grpSpPr>
+      <p:sp>
+        <p:nvSpPr>
+          <p:cNvPr id="2" name="Espaço Reservado para Imagem de Slide 1"/>
+          <p:cNvSpPr>
+            <a:spLocks noGrp="1" noRot="1" noChangeAspect="1"/>
+          </p:cNvSpPr>
+          <p:nvPr>
+            <p:ph type="sldImg"/>
+          </p:nvPr>
+        </p:nvSpPr>
+        <p:spPr/>
+      </p:sp>
+      <p:sp>
+        <p:nvSpPr>
+          <p:cNvPr id="3" name="Espaço Reservado para Anotações 2"/>
+          <p:cNvSpPr>
+            <a:spLocks noGrp="1"/>
+          </p:cNvSpPr>
+          <p:nvPr>
+            <p:ph type="body" idx="1"/>
+          </p:nvPr>
+        </p:nvSpPr>
+        <p:spPr/>
+        <p:txBody>
+          <a:bodyPr/>
+          <a:lstStyle/>
+          <a:p>
+            <a:endParaRPr lang="pt-BR" noProof="0" dirty="0"/>
+          </a:p>
+        </p:txBody>
+      </p:sp>
+      <p:sp>
+        <p:nvSpPr>
+          <p:cNvPr id="4" name="Espaço Reservado para Número de Slide 3"/>
+          <p:cNvSpPr>
+            <a:spLocks noGrp="1"/>
+          </p:cNvSpPr>
+          <p:nvPr>
+            <p:ph type="sldNum" sz="quarter" idx="5"/>
+          </p:nvPr>
+        </p:nvSpPr>
+        <p:spPr/>
+        <p:txBody>
+          <a:bodyPr/>
+          <a:lstStyle/>
+          <a:p>
+            <a:pPr rtl="0"/>
+            <a:fld id="{35BAF473-2665-42A7-89E3-C7BA7EB58D12}" type="slidenum">
+              <a:rPr lang="pt-BR" smtClean="0"/>
+              <a:t>6</a:t>
             </a:fld>
             <a:endParaRPr lang="pt-BR"/>
           </a:p>
@@ -10619,27 +10705,7 @@
                     <a:latin typeface="Arial" panose="020B0604020202020204" pitchFamily="34" charset="0"/>
                     <a:cs typeface="Arial" panose="020B0604020202020204" pitchFamily="34" charset="0"/>
                   </a:rPr>
-                  <a:t>A probabilidade de uma sequência é o produto das probabilidades condicionais envolvendo sequências anteriores (e depende mais das sequências mais recentes </a:t>
-                </a:r>
-                <a:r>
-                  <a:rPr lang="pt-BR" sz="2400" dirty="0" err="1">
-                    <a:solidFill>
-                      <a:schemeClr val="accent1"/>
-                    </a:solidFill>
-                    <a:latin typeface="Arial" panose="020B0604020202020204" pitchFamily="34" charset="0"/>
-                    <a:cs typeface="Arial" panose="020B0604020202020204" pitchFamily="34" charset="0"/>
-                  </a:rPr>
-                  <a:t>Bengio</a:t>
-                </a:r>
-                <a:r>
-                  <a:rPr lang="pt-BR" sz="2400" dirty="0">
-                    <a:solidFill>
-                      <a:schemeClr val="accent1"/>
-                    </a:solidFill>
-                    <a:latin typeface="Arial" panose="020B0604020202020204" pitchFamily="34" charset="0"/>
-                    <a:cs typeface="Arial" panose="020B0604020202020204" pitchFamily="34" charset="0"/>
-                  </a:rPr>
-                  <a:t>, 2003):</a:t>
+                  <a:t>A probabilidade de uma sequência é o produto das probabilidades condicionais envolvendo sequências anteriores:</a:t>
                 </a:r>
               </a:p>
               <a:p>
@@ -11303,7 +11369,7 @@
             <a:pPr algn="l" rtl="0"/>
             <a:r>
               <a:rPr lang="pt-BR" dirty="0"/>
-              <a:t>Contribuições do artigo</a:t>
+              <a:t>Conceitos importantes</a:t>
             </a:r>
           </a:p>
         </p:txBody>
@@ -11549,319 +11615,1023 @@
           </a:p>
         </p:txBody>
       </p:sp>
-      <p:sp>
-        <p:nvSpPr>
-          <p:cNvPr id="6" name="Espaço Reservado para Conteúdo 3">
-            <a:extLst>
-              <a:ext uri="{FF2B5EF4-FFF2-40B4-BE49-F238E27FC236}">
-                <a16:creationId xmlns:a16="http://schemas.microsoft.com/office/drawing/2014/main" id="{01D5BDAE-396B-7FC5-DCF9-C8B3895676EC}"/>
-              </a:ext>
-            </a:extLst>
-          </p:cNvPr>
-          <p:cNvSpPr txBox="1">
-            <a:spLocks/>
-          </p:cNvSpPr>
-          <p:nvPr/>
-        </p:nvSpPr>
-        <p:spPr>
-          <a:xfrm>
-            <a:off x="176169" y="1502263"/>
-            <a:ext cx="11694252" cy="5010680"/>
-          </a:xfrm>
-          <a:prstGeom prst="rect">
-            <a:avLst/>
-          </a:prstGeom>
-        </p:spPr>
-        <p:txBody>
-          <a:bodyPr rtlCol="0">
-            <a:normAutofit/>
-          </a:bodyPr>
-          <a:lstStyle>
-            <a:lvl1pPr marL="228600" indent="-228600" algn="l" defTabSz="914400" rtl="0" eaLnBrk="1" latinLnBrk="0" hangingPunct="1">
-              <a:lnSpc>
-                <a:spcPct val="90000"/>
-              </a:lnSpc>
-              <a:spcBef>
-                <a:spcPts val="1000"/>
-              </a:spcBef>
-              <a:buFont typeface="Arial" panose="020B0604020202020204" pitchFamily="34" charset="0"/>
-              <a:buChar char="•"/>
-              <a:defRPr sz="2800" kern="1200">
-                <a:solidFill>
-                  <a:schemeClr val="tx1"/>
-                </a:solidFill>
-                <a:latin typeface="+mn-lt"/>
-                <a:ea typeface="+mn-ea"/>
-                <a:cs typeface="+mn-cs"/>
-              </a:defRPr>
-            </a:lvl1pPr>
-            <a:lvl2pPr marL="685800" indent="-228600" algn="l" defTabSz="914400" rtl="0" eaLnBrk="1" latinLnBrk="0" hangingPunct="1">
-              <a:lnSpc>
-                <a:spcPct val="90000"/>
-              </a:lnSpc>
-              <a:spcBef>
-                <a:spcPts val="500"/>
-              </a:spcBef>
-              <a:buFont typeface="Arial" panose="020B0604020202020204" pitchFamily="34" charset="0"/>
-              <a:buChar char="•"/>
-              <a:defRPr sz="2400" kern="1200">
-                <a:solidFill>
-                  <a:schemeClr val="tx1"/>
-                </a:solidFill>
-                <a:latin typeface="+mn-lt"/>
-                <a:ea typeface="+mn-ea"/>
-                <a:cs typeface="+mn-cs"/>
-              </a:defRPr>
-            </a:lvl2pPr>
-            <a:lvl3pPr marL="1143000" indent="-228600" algn="l" defTabSz="914400" rtl="0" eaLnBrk="1" latinLnBrk="0" hangingPunct="1">
-              <a:lnSpc>
-                <a:spcPct val="90000"/>
-              </a:lnSpc>
-              <a:spcBef>
-                <a:spcPts val="500"/>
-              </a:spcBef>
-              <a:buFont typeface="Arial" panose="020B0604020202020204" pitchFamily="34" charset="0"/>
-              <a:buChar char="•"/>
-              <a:defRPr sz="2000" kern="1200">
-                <a:solidFill>
-                  <a:schemeClr val="tx1"/>
-                </a:solidFill>
-                <a:latin typeface="+mn-lt"/>
-                <a:ea typeface="+mn-ea"/>
-                <a:cs typeface="+mn-cs"/>
-              </a:defRPr>
-            </a:lvl3pPr>
-            <a:lvl4pPr marL="1600200" indent="-228600" algn="l" defTabSz="914400" rtl="0" eaLnBrk="1" latinLnBrk="0" hangingPunct="1">
-              <a:lnSpc>
-                <a:spcPct val="90000"/>
-              </a:lnSpc>
-              <a:spcBef>
-                <a:spcPts val="500"/>
-              </a:spcBef>
-              <a:buFont typeface="Arial" panose="020B0604020202020204" pitchFamily="34" charset="0"/>
-              <a:buChar char="•"/>
-              <a:defRPr sz="1800" kern="1200">
-                <a:solidFill>
-                  <a:schemeClr val="tx1"/>
-                </a:solidFill>
-                <a:latin typeface="+mn-lt"/>
-                <a:ea typeface="+mn-ea"/>
-                <a:cs typeface="+mn-cs"/>
-              </a:defRPr>
-            </a:lvl4pPr>
-            <a:lvl5pPr marL="2057400" indent="-228600" algn="l" defTabSz="914400" rtl="0" eaLnBrk="1" latinLnBrk="0" hangingPunct="1">
-              <a:lnSpc>
-                <a:spcPct val="90000"/>
-              </a:lnSpc>
-              <a:spcBef>
-                <a:spcPts val="500"/>
-              </a:spcBef>
-              <a:buFont typeface="Arial" panose="020B0604020202020204" pitchFamily="34" charset="0"/>
-              <a:buChar char="•"/>
-              <a:defRPr sz="1800" kern="1200">
-                <a:solidFill>
-                  <a:schemeClr val="tx1"/>
-                </a:solidFill>
-                <a:latin typeface="+mn-lt"/>
-                <a:ea typeface="+mn-ea"/>
-                <a:cs typeface="+mn-cs"/>
-              </a:defRPr>
-            </a:lvl5pPr>
-            <a:lvl6pPr marL="2514600" indent="-228600" algn="l" defTabSz="914400" rtl="0" eaLnBrk="1" latinLnBrk="0" hangingPunct="1">
-              <a:lnSpc>
-                <a:spcPct val="90000"/>
-              </a:lnSpc>
-              <a:spcBef>
-                <a:spcPts val="500"/>
-              </a:spcBef>
-              <a:buFont typeface="Arial" panose="020B0604020202020204" pitchFamily="34" charset="0"/>
-              <a:buChar char="•"/>
-              <a:defRPr sz="1800" kern="1200">
-                <a:solidFill>
-                  <a:schemeClr val="tx1"/>
-                </a:solidFill>
-                <a:latin typeface="+mn-lt"/>
-                <a:ea typeface="+mn-ea"/>
-                <a:cs typeface="+mn-cs"/>
-              </a:defRPr>
-            </a:lvl6pPr>
-            <a:lvl7pPr marL="2971800" indent="-228600" algn="l" defTabSz="914400" rtl="0" eaLnBrk="1" latinLnBrk="0" hangingPunct="1">
-              <a:lnSpc>
-                <a:spcPct val="90000"/>
-              </a:lnSpc>
-              <a:spcBef>
-                <a:spcPts val="500"/>
-              </a:spcBef>
-              <a:buFont typeface="Arial" panose="020B0604020202020204" pitchFamily="34" charset="0"/>
-              <a:buChar char="•"/>
-              <a:defRPr sz="1800" kern="1200">
-                <a:solidFill>
-                  <a:schemeClr val="tx1"/>
-                </a:solidFill>
-                <a:latin typeface="+mn-lt"/>
-                <a:ea typeface="+mn-ea"/>
-                <a:cs typeface="+mn-cs"/>
-              </a:defRPr>
-            </a:lvl7pPr>
-            <a:lvl8pPr marL="3429000" indent="-228600" algn="l" defTabSz="914400" rtl="0" eaLnBrk="1" latinLnBrk="0" hangingPunct="1">
-              <a:lnSpc>
-                <a:spcPct val="90000"/>
-              </a:lnSpc>
-              <a:spcBef>
-                <a:spcPts val="500"/>
-              </a:spcBef>
-              <a:buFont typeface="Arial" panose="020B0604020202020204" pitchFamily="34" charset="0"/>
-              <a:buChar char="•"/>
-              <a:defRPr sz="1800" kern="1200">
-                <a:solidFill>
-                  <a:schemeClr val="tx1"/>
-                </a:solidFill>
-                <a:latin typeface="+mn-lt"/>
-                <a:ea typeface="+mn-ea"/>
-                <a:cs typeface="+mn-cs"/>
-              </a:defRPr>
-            </a:lvl8pPr>
-            <a:lvl9pPr marL="3886200" indent="-228600" algn="l" defTabSz="914400" rtl="0" eaLnBrk="1" latinLnBrk="0" hangingPunct="1">
-              <a:lnSpc>
-                <a:spcPct val="90000"/>
-              </a:lnSpc>
-              <a:spcBef>
-                <a:spcPts val="500"/>
-              </a:spcBef>
-              <a:buFont typeface="Arial" panose="020B0604020202020204" pitchFamily="34" charset="0"/>
-              <a:buChar char="•"/>
-              <a:defRPr sz="1800" kern="1200">
-                <a:solidFill>
-                  <a:schemeClr val="tx1"/>
-                </a:solidFill>
-                <a:latin typeface="+mn-lt"/>
-                <a:ea typeface="+mn-ea"/>
-                <a:cs typeface="+mn-cs"/>
-              </a:defRPr>
-            </a:lvl9pPr>
-          </a:lstStyle>
-          <a:p>
-            <a:pPr marL="457200" indent="-457200">
-              <a:buAutoNum type="arabicPeriod"/>
-            </a:pPr>
-            <a:r>
-              <a:rPr lang="pt-BR" sz="2400" dirty="0">
-                <a:solidFill>
-                  <a:schemeClr val="accent1"/>
-                </a:solidFill>
-                <a:latin typeface="Arial" panose="020B0604020202020204" pitchFamily="34" charset="0"/>
-                <a:cs typeface="Arial" panose="020B0604020202020204" pitchFamily="34" charset="0"/>
-              </a:rPr>
-              <a:t>Proposta e treinamento do GPT-2</a:t>
-            </a:r>
-          </a:p>
-          <a:p>
-            <a:pPr marL="457200" indent="-457200">
-              <a:buAutoNum type="arabicPeriod"/>
-            </a:pPr>
-            <a:endParaRPr lang="pt-BR" sz="2400" dirty="0">
-              <a:solidFill>
-                <a:schemeClr val="accent1"/>
-              </a:solidFill>
-              <a:latin typeface="Arial" panose="020B0604020202020204" pitchFamily="34" charset="0"/>
-              <a:cs typeface="Arial" panose="020B0604020202020204" pitchFamily="34" charset="0"/>
-            </a:endParaRPr>
-          </a:p>
-          <a:p>
-            <a:pPr marL="457200" indent="-457200">
-              <a:buAutoNum type="arabicPeriod"/>
-            </a:pPr>
-            <a:r>
-              <a:rPr lang="pt-BR" sz="2400" dirty="0">
-                <a:solidFill>
-                  <a:schemeClr val="accent1"/>
-                </a:solidFill>
-                <a:latin typeface="Arial" panose="020B0604020202020204" pitchFamily="34" charset="0"/>
-                <a:cs typeface="Arial" panose="020B0604020202020204" pitchFamily="34" charset="0"/>
-              </a:rPr>
-              <a:t>Aplicação do modelo a diversas bases de dados e discussões sobre que tipo de problema essa rede supera o estado da arte.</a:t>
-            </a:r>
-          </a:p>
-          <a:p>
-            <a:pPr marL="457200" indent="-457200">
-              <a:buAutoNum type="arabicPeriod"/>
-            </a:pPr>
-            <a:endParaRPr lang="pt-BR" sz="2400" dirty="0">
-              <a:solidFill>
-                <a:schemeClr val="accent1"/>
-              </a:solidFill>
-              <a:latin typeface="Arial" panose="020B0604020202020204" pitchFamily="34" charset="0"/>
-              <a:cs typeface="Arial" panose="020B0604020202020204" pitchFamily="34" charset="0"/>
-            </a:endParaRPr>
-          </a:p>
-          <a:p>
-            <a:pPr marL="457200" indent="-457200">
-              <a:buAutoNum type="arabicPeriod"/>
-            </a:pPr>
-            <a:r>
-              <a:rPr lang="pt-BR" sz="2400" dirty="0">
-                <a:solidFill>
-                  <a:schemeClr val="accent1"/>
-                </a:solidFill>
-                <a:latin typeface="Arial" panose="020B0604020202020204" pitchFamily="34" charset="0"/>
-                <a:cs typeface="Arial" panose="020B0604020202020204" pitchFamily="34" charset="0"/>
-              </a:rPr>
-              <a:t>Discussões sobre as limitações do modelo. Aborda a questão da generalização versus memorização (</a:t>
-            </a:r>
-            <a:r>
-              <a:rPr lang="pt-BR" sz="2400" dirty="0" err="1">
-                <a:solidFill>
-                  <a:schemeClr val="accent1"/>
-                </a:solidFill>
-                <a:latin typeface="Arial" panose="020B0604020202020204" pitchFamily="34" charset="0"/>
-                <a:cs typeface="Arial" panose="020B0604020202020204" pitchFamily="34" charset="0"/>
-              </a:rPr>
-              <a:t>overlap</a:t>
-            </a:r>
-            <a:r>
-              <a:rPr lang="pt-BR" sz="2400" dirty="0">
-                <a:solidFill>
-                  <a:schemeClr val="accent1"/>
-                </a:solidFill>
-                <a:latin typeface="Arial" panose="020B0604020202020204" pitchFamily="34" charset="0"/>
-                <a:cs typeface="Arial" panose="020B0604020202020204" pitchFamily="34" charset="0"/>
-              </a:rPr>
-              <a:t> de ~1-6% dependendo do teste) e fala de cuidados na curadoria da base.</a:t>
-            </a:r>
-          </a:p>
-          <a:p>
-            <a:pPr marL="457200" indent="-457200">
-              <a:buAutoNum type="arabicPeriod"/>
-            </a:pPr>
-            <a:endParaRPr lang="pt-BR" sz="2400" dirty="0">
-              <a:solidFill>
-                <a:schemeClr val="accent1"/>
-              </a:solidFill>
-              <a:latin typeface="Arial" panose="020B0604020202020204" pitchFamily="34" charset="0"/>
-              <a:cs typeface="Arial" panose="020B0604020202020204" pitchFamily="34" charset="0"/>
-            </a:endParaRPr>
-          </a:p>
-          <a:p>
-            <a:pPr marL="457200" indent="-457200">
-              <a:buAutoNum type="arabicPeriod"/>
-            </a:pPr>
-            <a:r>
-              <a:rPr lang="pt-BR" sz="2400" dirty="0">
-                <a:solidFill>
-                  <a:schemeClr val="accent1"/>
-                </a:solidFill>
-                <a:latin typeface="Arial" panose="020B0604020202020204" pitchFamily="34" charset="0"/>
-                <a:cs typeface="Arial" panose="020B0604020202020204" pitchFamily="34" charset="0"/>
-              </a:rPr>
-              <a:t>Resultados sugerem que a abordagem que tomaram é adequada para resolver diversas tarefas sem a necessidade se supervisão explícita.</a:t>
-            </a:r>
-          </a:p>
-        </p:txBody>
-      </p:sp>
+      <mc:AlternateContent xmlns:mc="http://schemas.openxmlformats.org/markup-compatibility/2006">
+        <mc:Choice xmlns:a14="http://schemas.microsoft.com/office/drawing/2010/main" Requires="a14">
+          <p:sp>
+            <p:nvSpPr>
+              <p:cNvPr id="3" name="Espaço Reservado para Conteúdo 3">
+                <a:extLst>
+                  <a:ext uri="{FF2B5EF4-FFF2-40B4-BE49-F238E27FC236}">
+                    <a16:creationId xmlns:a16="http://schemas.microsoft.com/office/drawing/2014/main" id="{844E510C-6C66-9514-573E-0EC1B83DF3EA}"/>
+                  </a:ext>
+                </a:extLst>
+              </p:cNvPr>
+              <p:cNvSpPr txBox="1">
+                <a:spLocks/>
+              </p:cNvSpPr>
+              <p:nvPr/>
+            </p:nvSpPr>
+            <p:spPr>
+              <a:xfrm>
+                <a:off x="176169" y="1502263"/>
+                <a:ext cx="11694252" cy="5112456"/>
+              </a:xfrm>
+              <a:prstGeom prst="rect">
+                <a:avLst/>
+              </a:prstGeom>
+            </p:spPr>
+            <p:txBody>
+              <a:bodyPr rtlCol="0">
+                <a:normAutofit lnSpcReduction="10000"/>
+              </a:bodyPr>
+              <a:lstStyle>
+                <a:lvl1pPr marL="228600" indent="-228600" algn="l" defTabSz="914400" rtl="0" eaLnBrk="1" latinLnBrk="0" hangingPunct="1">
+                  <a:lnSpc>
+                    <a:spcPct val="90000"/>
+                  </a:lnSpc>
+                  <a:spcBef>
+                    <a:spcPts val="1000"/>
+                  </a:spcBef>
+                  <a:buFont typeface="Arial" panose="020B0604020202020204" pitchFamily="34" charset="0"/>
+                  <a:buChar char="•"/>
+                  <a:defRPr sz="2800" kern="1200">
+                    <a:solidFill>
+                      <a:schemeClr val="tx1"/>
+                    </a:solidFill>
+                    <a:latin typeface="+mn-lt"/>
+                    <a:ea typeface="+mn-ea"/>
+                    <a:cs typeface="+mn-cs"/>
+                  </a:defRPr>
+                </a:lvl1pPr>
+                <a:lvl2pPr marL="685800" indent="-228600" algn="l" defTabSz="914400" rtl="0" eaLnBrk="1" latinLnBrk="0" hangingPunct="1">
+                  <a:lnSpc>
+                    <a:spcPct val="90000"/>
+                  </a:lnSpc>
+                  <a:spcBef>
+                    <a:spcPts val="500"/>
+                  </a:spcBef>
+                  <a:buFont typeface="Arial" panose="020B0604020202020204" pitchFamily="34" charset="0"/>
+                  <a:buChar char="•"/>
+                  <a:defRPr sz="2400" kern="1200">
+                    <a:solidFill>
+                      <a:schemeClr val="tx1"/>
+                    </a:solidFill>
+                    <a:latin typeface="+mn-lt"/>
+                    <a:ea typeface="+mn-ea"/>
+                    <a:cs typeface="+mn-cs"/>
+                  </a:defRPr>
+                </a:lvl2pPr>
+                <a:lvl3pPr marL="1143000" indent="-228600" algn="l" defTabSz="914400" rtl="0" eaLnBrk="1" latinLnBrk="0" hangingPunct="1">
+                  <a:lnSpc>
+                    <a:spcPct val="90000"/>
+                  </a:lnSpc>
+                  <a:spcBef>
+                    <a:spcPts val="500"/>
+                  </a:spcBef>
+                  <a:buFont typeface="Arial" panose="020B0604020202020204" pitchFamily="34" charset="0"/>
+                  <a:buChar char="•"/>
+                  <a:defRPr sz="2000" kern="1200">
+                    <a:solidFill>
+                      <a:schemeClr val="tx1"/>
+                    </a:solidFill>
+                    <a:latin typeface="+mn-lt"/>
+                    <a:ea typeface="+mn-ea"/>
+                    <a:cs typeface="+mn-cs"/>
+                  </a:defRPr>
+                </a:lvl3pPr>
+                <a:lvl4pPr marL="1600200" indent="-228600" algn="l" defTabSz="914400" rtl="0" eaLnBrk="1" latinLnBrk="0" hangingPunct="1">
+                  <a:lnSpc>
+                    <a:spcPct val="90000"/>
+                  </a:lnSpc>
+                  <a:spcBef>
+                    <a:spcPts val="500"/>
+                  </a:spcBef>
+                  <a:buFont typeface="Arial" panose="020B0604020202020204" pitchFamily="34" charset="0"/>
+                  <a:buChar char="•"/>
+                  <a:defRPr sz="1800" kern="1200">
+                    <a:solidFill>
+                      <a:schemeClr val="tx1"/>
+                    </a:solidFill>
+                    <a:latin typeface="+mn-lt"/>
+                    <a:ea typeface="+mn-ea"/>
+                    <a:cs typeface="+mn-cs"/>
+                  </a:defRPr>
+                </a:lvl4pPr>
+                <a:lvl5pPr marL="2057400" indent="-228600" algn="l" defTabSz="914400" rtl="0" eaLnBrk="1" latinLnBrk="0" hangingPunct="1">
+                  <a:lnSpc>
+                    <a:spcPct val="90000"/>
+                  </a:lnSpc>
+                  <a:spcBef>
+                    <a:spcPts val="500"/>
+                  </a:spcBef>
+                  <a:buFont typeface="Arial" panose="020B0604020202020204" pitchFamily="34" charset="0"/>
+                  <a:buChar char="•"/>
+                  <a:defRPr sz="1800" kern="1200">
+                    <a:solidFill>
+                      <a:schemeClr val="tx1"/>
+                    </a:solidFill>
+                    <a:latin typeface="+mn-lt"/>
+                    <a:ea typeface="+mn-ea"/>
+                    <a:cs typeface="+mn-cs"/>
+                  </a:defRPr>
+                </a:lvl5pPr>
+                <a:lvl6pPr marL="2514600" indent="-228600" algn="l" defTabSz="914400" rtl="0" eaLnBrk="1" latinLnBrk="0" hangingPunct="1">
+                  <a:lnSpc>
+                    <a:spcPct val="90000"/>
+                  </a:lnSpc>
+                  <a:spcBef>
+                    <a:spcPts val="500"/>
+                  </a:spcBef>
+                  <a:buFont typeface="Arial" panose="020B0604020202020204" pitchFamily="34" charset="0"/>
+                  <a:buChar char="•"/>
+                  <a:defRPr sz="1800" kern="1200">
+                    <a:solidFill>
+                      <a:schemeClr val="tx1"/>
+                    </a:solidFill>
+                    <a:latin typeface="+mn-lt"/>
+                    <a:ea typeface="+mn-ea"/>
+                    <a:cs typeface="+mn-cs"/>
+                  </a:defRPr>
+                </a:lvl6pPr>
+                <a:lvl7pPr marL="2971800" indent="-228600" algn="l" defTabSz="914400" rtl="0" eaLnBrk="1" latinLnBrk="0" hangingPunct="1">
+                  <a:lnSpc>
+                    <a:spcPct val="90000"/>
+                  </a:lnSpc>
+                  <a:spcBef>
+                    <a:spcPts val="500"/>
+                  </a:spcBef>
+                  <a:buFont typeface="Arial" panose="020B0604020202020204" pitchFamily="34" charset="0"/>
+                  <a:buChar char="•"/>
+                  <a:defRPr sz="1800" kern="1200">
+                    <a:solidFill>
+                      <a:schemeClr val="tx1"/>
+                    </a:solidFill>
+                    <a:latin typeface="+mn-lt"/>
+                    <a:ea typeface="+mn-ea"/>
+                    <a:cs typeface="+mn-cs"/>
+                  </a:defRPr>
+                </a:lvl7pPr>
+                <a:lvl8pPr marL="3429000" indent="-228600" algn="l" defTabSz="914400" rtl="0" eaLnBrk="1" latinLnBrk="0" hangingPunct="1">
+                  <a:lnSpc>
+                    <a:spcPct val="90000"/>
+                  </a:lnSpc>
+                  <a:spcBef>
+                    <a:spcPts val="500"/>
+                  </a:spcBef>
+                  <a:buFont typeface="Arial" panose="020B0604020202020204" pitchFamily="34" charset="0"/>
+                  <a:buChar char="•"/>
+                  <a:defRPr sz="1800" kern="1200">
+                    <a:solidFill>
+                      <a:schemeClr val="tx1"/>
+                    </a:solidFill>
+                    <a:latin typeface="+mn-lt"/>
+                    <a:ea typeface="+mn-ea"/>
+                    <a:cs typeface="+mn-cs"/>
+                  </a:defRPr>
+                </a:lvl8pPr>
+                <a:lvl9pPr marL="3886200" indent="-228600" algn="l" defTabSz="914400" rtl="0" eaLnBrk="1" latinLnBrk="0" hangingPunct="1">
+                  <a:lnSpc>
+                    <a:spcPct val="90000"/>
+                  </a:lnSpc>
+                  <a:spcBef>
+                    <a:spcPts val="500"/>
+                  </a:spcBef>
+                  <a:buFont typeface="Arial" panose="020B0604020202020204" pitchFamily="34" charset="0"/>
+                  <a:buChar char="•"/>
+                  <a:defRPr sz="1800" kern="1200">
+                    <a:solidFill>
+                      <a:schemeClr val="tx1"/>
+                    </a:solidFill>
+                    <a:latin typeface="+mn-lt"/>
+                    <a:ea typeface="+mn-ea"/>
+                    <a:cs typeface="+mn-cs"/>
+                  </a:defRPr>
+                </a:lvl9pPr>
+              </a:lstStyle>
+              <a:p>
+                <a:pPr marL="0" indent="0">
+                  <a:buNone/>
+                </a:pPr>
+                <a:r>
+                  <a:rPr lang="pt-BR" sz="2400" b="1" dirty="0">
+                    <a:solidFill>
+                      <a:schemeClr val="accent1"/>
+                    </a:solidFill>
+                    <a:latin typeface="Arial" panose="020B0604020202020204" pitchFamily="34" charset="0"/>
+                    <a:cs typeface="Arial" panose="020B0604020202020204" pitchFamily="34" charset="0"/>
+                  </a:rPr>
+                  <a:t>Modelo n-grama:</a:t>
+                </a:r>
+                <a:endParaRPr lang="pt-BR" sz="2400" dirty="0">
+                  <a:solidFill>
+                    <a:schemeClr val="accent1"/>
+                  </a:solidFill>
+                  <a:latin typeface="Arial" panose="020B0604020202020204" pitchFamily="34" charset="0"/>
+                  <a:cs typeface="Arial" panose="020B0604020202020204" pitchFamily="34" charset="0"/>
+                </a:endParaRPr>
+              </a:p>
+              <a:p>
+                <a:pPr marL="0" indent="0">
+                  <a:buNone/>
+                </a:pPr>
+                <a:endParaRPr lang="pt-BR" sz="2400" dirty="0">
+                  <a:solidFill>
+                    <a:schemeClr val="accent1"/>
+                  </a:solidFill>
+                  <a:latin typeface="Arial" panose="020B0604020202020204" pitchFamily="34" charset="0"/>
+                  <a:cs typeface="Arial" panose="020B0604020202020204" pitchFamily="34" charset="0"/>
+                </a:endParaRPr>
+              </a:p>
+              <a:p>
+                <a:pPr marL="0" indent="0">
+                  <a:buNone/>
+                </a:pPr>
+                <a14:m>
+                  <m:oMathPara xmlns:m="http://schemas.openxmlformats.org/officeDocument/2006/math">
+                    <m:oMathParaPr>
+                      <m:jc m:val="centerGroup"/>
+                    </m:oMathParaPr>
+                    <m:oMath xmlns:m="http://schemas.openxmlformats.org/officeDocument/2006/math">
+                      <m:r>
+                        <a:rPr lang="pt-BR" sz="2400" b="0" i="1" smtClean="0">
+                          <a:solidFill>
+                            <a:schemeClr val="accent1"/>
+                          </a:solidFill>
+                          <a:latin typeface="Cambria Math" panose="02040503050406030204" pitchFamily="18" charset="0"/>
+                          <a:cs typeface="Arial" panose="020B0604020202020204" pitchFamily="34" charset="0"/>
+                        </a:rPr>
+                        <m:t>𝑝𝑟𝑜𝑏</m:t>
+                      </m:r>
+                      <m:d>
+                        <m:dPr>
+                          <m:ctrlPr>
+                            <a:rPr lang="pt-BR" sz="2400" b="0" i="1" smtClean="0">
+                              <a:solidFill>
+                                <a:schemeClr val="accent1"/>
+                              </a:solidFill>
+                              <a:latin typeface="Cambria Math" panose="02040503050406030204" pitchFamily="18" charset="0"/>
+                              <a:cs typeface="Arial" panose="020B0604020202020204" pitchFamily="34" charset="0"/>
+                            </a:rPr>
+                          </m:ctrlPr>
+                        </m:dPr>
+                        <m:e>
+                          <m:sSubSup>
+                            <m:sSubSupPr>
+                              <m:ctrlPr>
+                                <a:rPr lang="pt-BR" sz="2400" b="0" i="1" smtClean="0">
+                                  <a:solidFill>
+                                    <a:schemeClr val="accent1"/>
+                                  </a:solidFill>
+                                  <a:latin typeface="Cambria Math" panose="02040503050406030204" pitchFamily="18" charset="0"/>
+                                  <a:cs typeface="Arial" panose="020B0604020202020204" pitchFamily="34" charset="0"/>
+                                </a:rPr>
+                              </m:ctrlPr>
+                            </m:sSubSupPr>
+                            <m:e>
+                              <m:r>
+                                <a:rPr lang="pt-BR" sz="2400" b="0" i="1" smtClean="0">
+                                  <a:solidFill>
+                                    <a:schemeClr val="accent1"/>
+                                  </a:solidFill>
+                                  <a:latin typeface="Cambria Math" panose="02040503050406030204" pitchFamily="18" charset="0"/>
+                                  <a:cs typeface="Arial" panose="020B0604020202020204" pitchFamily="34" charset="0"/>
+                                </a:rPr>
+                                <m:t>𝑤</m:t>
+                              </m:r>
+                            </m:e>
+                            <m:sub>
+                              <m:r>
+                                <a:rPr lang="pt-BR" sz="2400" b="0" i="1" smtClean="0">
+                                  <a:solidFill>
+                                    <a:schemeClr val="accent1"/>
+                                  </a:solidFill>
+                                  <a:latin typeface="Cambria Math" panose="02040503050406030204" pitchFamily="18" charset="0"/>
+                                  <a:cs typeface="Arial" panose="020B0604020202020204" pitchFamily="34" charset="0"/>
+                                </a:rPr>
+                                <m:t>𝑡</m:t>
+                              </m:r>
+                            </m:sub>
+                            <m:sup/>
+                          </m:sSubSup>
+                          <m:r>
+                            <a:rPr lang="pt-BR" sz="2400" b="0" i="1" smtClean="0">
+                              <a:solidFill>
+                                <a:schemeClr val="accent1"/>
+                              </a:solidFill>
+                              <a:latin typeface="Cambria Math" panose="02040503050406030204" pitchFamily="18" charset="0"/>
+                              <a:cs typeface="Arial" panose="020B0604020202020204" pitchFamily="34" charset="0"/>
+                            </a:rPr>
+                            <m:t>|</m:t>
+                          </m:r>
+                          <m:sSubSup>
+                            <m:sSubSupPr>
+                              <m:ctrlPr>
+                                <a:rPr lang="pt-BR" sz="2400" i="1">
+                                  <a:solidFill>
+                                    <a:schemeClr val="accent1"/>
+                                  </a:solidFill>
+                                  <a:latin typeface="Cambria Math" panose="02040503050406030204" pitchFamily="18" charset="0"/>
+                                  <a:cs typeface="Arial" panose="020B0604020202020204" pitchFamily="34" charset="0"/>
+                                </a:rPr>
+                              </m:ctrlPr>
+                            </m:sSubSupPr>
+                            <m:e>
+                              <m:r>
+                                <a:rPr lang="pt-BR" sz="2400" i="1">
+                                  <a:solidFill>
+                                    <a:schemeClr val="accent1"/>
+                                  </a:solidFill>
+                                  <a:latin typeface="Cambria Math" panose="02040503050406030204" pitchFamily="18" charset="0"/>
+                                  <a:cs typeface="Arial" panose="020B0604020202020204" pitchFamily="34" charset="0"/>
+                                </a:rPr>
+                                <m:t>𝑤</m:t>
+                              </m:r>
+                            </m:e>
+                            <m:sub>
+                              <m:r>
+                                <a:rPr lang="pt-BR" sz="2400" i="1">
+                                  <a:solidFill>
+                                    <a:schemeClr val="accent1"/>
+                                  </a:solidFill>
+                                  <a:latin typeface="Cambria Math" panose="02040503050406030204" pitchFamily="18" charset="0"/>
+                                  <a:cs typeface="Arial" panose="020B0604020202020204" pitchFamily="34" charset="0"/>
+                                </a:rPr>
+                                <m:t>1</m:t>
+                              </m:r>
+                            </m:sub>
+                            <m:sup>
+                              <m:r>
+                                <a:rPr lang="pt-BR" sz="2400" b="0" i="1" smtClean="0">
+                                  <a:solidFill>
+                                    <a:schemeClr val="accent1"/>
+                                  </a:solidFill>
+                                  <a:latin typeface="Cambria Math" panose="02040503050406030204" pitchFamily="18" charset="0"/>
+                                  <a:cs typeface="Arial" panose="020B0604020202020204" pitchFamily="34" charset="0"/>
+                                </a:rPr>
+                                <m:t>𝑡</m:t>
+                              </m:r>
+                              <m:r>
+                                <a:rPr lang="pt-BR" sz="2400" b="0" i="1" smtClean="0">
+                                  <a:solidFill>
+                                    <a:schemeClr val="accent1"/>
+                                  </a:solidFill>
+                                  <a:latin typeface="Cambria Math" panose="02040503050406030204" pitchFamily="18" charset="0"/>
+                                  <a:cs typeface="Arial" panose="020B0604020202020204" pitchFamily="34" charset="0"/>
+                                </a:rPr>
+                                <m:t>−1</m:t>
+                              </m:r>
+                            </m:sup>
+                          </m:sSubSup>
+                        </m:e>
+                      </m:d>
+                      <m:r>
+                        <a:rPr lang="pt-BR" sz="2400" b="0" i="1" smtClean="0">
+                          <a:solidFill>
+                            <a:schemeClr val="accent1"/>
+                          </a:solidFill>
+                          <a:latin typeface="Cambria Math" panose="02040503050406030204" pitchFamily="18" charset="0"/>
+                          <a:ea typeface="Cambria Math" panose="02040503050406030204" pitchFamily="18" charset="0"/>
+                          <a:cs typeface="Arial" panose="020B0604020202020204" pitchFamily="34" charset="0"/>
+                        </a:rPr>
+                        <m:t>≈</m:t>
+                      </m:r>
+                      <m:r>
+                        <a:rPr lang="pt-BR" sz="2400" i="1">
+                          <a:solidFill>
+                            <a:schemeClr val="accent1"/>
+                          </a:solidFill>
+                          <a:latin typeface="Cambria Math" panose="02040503050406030204" pitchFamily="18" charset="0"/>
+                          <a:cs typeface="Arial" panose="020B0604020202020204" pitchFamily="34" charset="0"/>
+                        </a:rPr>
+                        <m:t>𝑝𝑟𝑜𝑏</m:t>
+                      </m:r>
+                      <m:d>
+                        <m:dPr>
+                          <m:ctrlPr>
+                            <a:rPr lang="pt-BR" sz="2400" i="1">
+                              <a:solidFill>
+                                <a:schemeClr val="accent1"/>
+                              </a:solidFill>
+                              <a:latin typeface="Cambria Math" panose="02040503050406030204" pitchFamily="18" charset="0"/>
+                              <a:cs typeface="Arial" panose="020B0604020202020204" pitchFamily="34" charset="0"/>
+                            </a:rPr>
+                          </m:ctrlPr>
+                        </m:dPr>
+                        <m:e>
+                          <m:sSubSup>
+                            <m:sSubSupPr>
+                              <m:ctrlPr>
+                                <a:rPr lang="pt-BR" sz="2400" i="1">
+                                  <a:solidFill>
+                                    <a:schemeClr val="accent1"/>
+                                  </a:solidFill>
+                                  <a:latin typeface="Cambria Math" panose="02040503050406030204" pitchFamily="18" charset="0"/>
+                                  <a:cs typeface="Arial" panose="020B0604020202020204" pitchFamily="34" charset="0"/>
+                                </a:rPr>
+                              </m:ctrlPr>
+                            </m:sSubSupPr>
+                            <m:e>
+                              <m:r>
+                                <a:rPr lang="pt-BR" sz="2400" i="1">
+                                  <a:solidFill>
+                                    <a:schemeClr val="accent1"/>
+                                  </a:solidFill>
+                                  <a:latin typeface="Cambria Math" panose="02040503050406030204" pitchFamily="18" charset="0"/>
+                                  <a:cs typeface="Arial" panose="020B0604020202020204" pitchFamily="34" charset="0"/>
+                                </a:rPr>
+                                <m:t>𝑤</m:t>
+                              </m:r>
+                            </m:e>
+                            <m:sub>
+                              <m:r>
+                                <a:rPr lang="pt-BR" sz="2400" i="1">
+                                  <a:solidFill>
+                                    <a:schemeClr val="accent1"/>
+                                  </a:solidFill>
+                                  <a:latin typeface="Cambria Math" panose="02040503050406030204" pitchFamily="18" charset="0"/>
+                                  <a:cs typeface="Arial" panose="020B0604020202020204" pitchFamily="34" charset="0"/>
+                                </a:rPr>
+                                <m:t>𝑡</m:t>
+                              </m:r>
+                            </m:sub>
+                            <m:sup/>
+                          </m:sSubSup>
+                          <m:r>
+                            <a:rPr lang="pt-BR" sz="2400" i="1">
+                              <a:solidFill>
+                                <a:schemeClr val="accent1"/>
+                              </a:solidFill>
+                              <a:latin typeface="Cambria Math" panose="02040503050406030204" pitchFamily="18" charset="0"/>
+                              <a:cs typeface="Arial" panose="020B0604020202020204" pitchFamily="34" charset="0"/>
+                            </a:rPr>
+                            <m:t>|</m:t>
+                          </m:r>
+                          <m:sSubSup>
+                            <m:sSubSupPr>
+                              <m:ctrlPr>
+                                <a:rPr lang="pt-BR" sz="2400" i="1">
+                                  <a:solidFill>
+                                    <a:schemeClr val="accent1"/>
+                                  </a:solidFill>
+                                  <a:latin typeface="Cambria Math" panose="02040503050406030204" pitchFamily="18" charset="0"/>
+                                  <a:cs typeface="Arial" panose="020B0604020202020204" pitchFamily="34" charset="0"/>
+                                </a:rPr>
+                              </m:ctrlPr>
+                            </m:sSubSupPr>
+                            <m:e>
+                              <m:r>
+                                <a:rPr lang="pt-BR" sz="2400" i="1">
+                                  <a:solidFill>
+                                    <a:schemeClr val="accent1"/>
+                                  </a:solidFill>
+                                  <a:latin typeface="Cambria Math" panose="02040503050406030204" pitchFamily="18" charset="0"/>
+                                  <a:cs typeface="Arial" panose="020B0604020202020204" pitchFamily="34" charset="0"/>
+                                </a:rPr>
+                                <m:t>𝑤</m:t>
+                              </m:r>
+                            </m:e>
+                            <m:sub>
+                              <m:r>
+                                <a:rPr lang="pt-BR" sz="2400" b="0" i="1" smtClean="0">
+                                  <a:solidFill>
+                                    <a:schemeClr val="accent1"/>
+                                  </a:solidFill>
+                                  <a:latin typeface="Cambria Math" panose="02040503050406030204" pitchFamily="18" charset="0"/>
+                                  <a:cs typeface="Arial" panose="020B0604020202020204" pitchFamily="34" charset="0"/>
+                                </a:rPr>
+                                <m:t>𝑡</m:t>
+                              </m:r>
+                              <m:r>
+                                <a:rPr lang="pt-BR" sz="2400" b="0" i="1" smtClean="0">
+                                  <a:solidFill>
+                                    <a:schemeClr val="accent1"/>
+                                  </a:solidFill>
+                                  <a:latin typeface="Cambria Math" panose="02040503050406030204" pitchFamily="18" charset="0"/>
+                                  <a:cs typeface="Arial" panose="020B0604020202020204" pitchFamily="34" charset="0"/>
+                                </a:rPr>
+                                <m:t>−</m:t>
+                              </m:r>
+                              <m:r>
+                                <a:rPr lang="pt-BR" sz="2400" b="0" i="1" smtClean="0">
+                                  <a:solidFill>
+                                    <a:schemeClr val="accent1"/>
+                                  </a:solidFill>
+                                  <a:latin typeface="Cambria Math" panose="02040503050406030204" pitchFamily="18" charset="0"/>
+                                  <a:cs typeface="Arial" panose="020B0604020202020204" pitchFamily="34" charset="0"/>
+                                </a:rPr>
+                                <m:t>𝑛</m:t>
+                              </m:r>
+                              <m:r>
+                                <a:rPr lang="pt-BR" sz="2400" b="0" i="1" smtClean="0">
+                                  <a:solidFill>
+                                    <a:schemeClr val="accent1"/>
+                                  </a:solidFill>
+                                  <a:latin typeface="Cambria Math" panose="02040503050406030204" pitchFamily="18" charset="0"/>
+                                  <a:cs typeface="Arial" panose="020B0604020202020204" pitchFamily="34" charset="0"/>
+                                </a:rPr>
+                                <m:t>−1</m:t>
+                              </m:r>
+                            </m:sub>
+                            <m:sup>
+                              <m:r>
+                                <a:rPr lang="pt-BR" sz="2400" i="1">
+                                  <a:solidFill>
+                                    <a:schemeClr val="accent1"/>
+                                  </a:solidFill>
+                                  <a:latin typeface="Cambria Math" panose="02040503050406030204" pitchFamily="18" charset="0"/>
+                                  <a:cs typeface="Arial" panose="020B0604020202020204" pitchFamily="34" charset="0"/>
+                                </a:rPr>
+                                <m:t>𝑡</m:t>
+                              </m:r>
+                              <m:r>
+                                <a:rPr lang="pt-BR" sz="2400" i="1">
+                                  <a:solidFill>
+                                    <a:schemeClr val="accent1"/>
+                                  </a:solidFill>
+                                  <a:latin typeface="Cambria Math" panose="02040503050406030204" pitchFamily="18" charset="0"/>
+                                  <a:cs typeface="Arial" panose="020B0604020202020204" pitchFamily="34" charset="0"/>
+                                </a:rPr>
+                                <m:t>−1</m:t>
+                              </m:r>
+                            </m:sup>
+                          </m:sSubSup>
+                        </m:e>
+                      </m:d>
+                    </m:oMath>
+                  </m:oMathPara>
+                </a14:m>
+                <a:endParaRPr lang="pt-BR" sz="2400" dirty="0">
+                  <a:solidFill>
+                    <a:schemeClr val="accent1"/>
+                  </a:solidFill>
+                  <a:latin typeface="Arial" panose="020B0604020202020204" pitchFamily="34" charset="0"/>
+                  <a:cs typeface="Arial" panose="020B0604020202020204" pitchFamily="34" charset="0"/>
+                </a:endParaRPr>
+              </a:p>
+              <a:p>
+                <a:pPr marL="0" indent="0">
+                  <a:buNone/>
+                </a:pPr>
+                <a:endParaRPr lang="pt-BR" sz="2400" dirty="0">
+                  <a:solidFill>
+                    <a:schemeClr val="accent1"/>
+                  </a:solidFill>
+                  <a:latin typeface="Arial" panose="020B0604020202020204" pitchFamily="34" charset="0"/>
+                  <a:cs typeface="Arial" panose="020B0604020202020204" pitchFamily="34" charset="0"/>
+                </a:endParaRPr>
+              </a:p>
+              <a:p>
+                <a:pPr marL="0" indent="0">
+                  <a:buNone/>
+                </a:pPr>
+                <a:r>
+                  <a:rPr lang="pt-BR" sz="2400" dirty="0">
+                    <a:solidFill>
+                      <a:schemeClr val="accent1"/>
+                    </a:solidFill>
+                    <a:latin typeface="Arial" panose="020B0604020202020204" pitchFamily="34" charset="0"/>
+                    <a:cs typeface="Arial" panose="020B0604020202020204" pitchFamily="34" charset="0"/>
+                  </a:rPr>
+                  <a:t>Por exemplo, suponha uma sequência de T palavras. A probabilidade de adicionar a T’</a:t>
+                </a:r>
+                <a:r>
+                  <a:rPr lang="pt-BR" sz="2400" dirty="0" err="1">
+                    <a:solidFill>
+                      <a:schemeClr val="accent1"/>
+                    </a:solidFill>
+                    <a:latin typeface="Arial" panose="020B0604020202020204" pitchFamily="34" charset="0"/>
+                    <a:cs typeface="Arial" panose="020B0604020202020204" pitchFamily="34" charset="0"/>
+                  </a:rPr>
+                  <a:t>ésima</a:t>
+                </a:r>
+                <a:r>
+                  <a:rPr lang="pt-BR" sz="2400" dirty="0">
+                    <a:solidFill>
+                      <a:schemeClr val="accent1"/>
+                    </a:solidFill>
+                    <a:latin typeface="Arial" panose="020B0604020202020204" pitchFamily="34" charset="0"/>
+                    <a:cs typeface="Arial" panose="020B0604020202020204" pitchFamily="34" charset="0"/>
+                  </a:rPr>
+                  <a:t> palavra na sequência completa (1 ... T-1) é aproximadamente igual a probabilidade de adicionar essa mesma palavra considerando só as n-1 últimas palavras (sequência (T-n-1 ... T-1) ):</a:t>
+                </a:r>
+              </a:p>
+              <a:p>
+                <a:pPr marL="0" indent="0">
+                  <a:buNone/>
+                </a:pPr>
+                <a:endParaRPr lang="pt-BR" sz="2400" dirty="0">
+                  <a:solidFill>
+                    <a:schemeClr val="accent1"/>
+                  </a:solidFill>
+                  <a:latin typeface="Arial" panose="020B0604020202020204" pitchFamily="34" charset="0"/>
+                  <a:cs typeface="Arial" panose="020B0604020202020204" pitchFamily="34" charset="0"/>
+                </a:endParaRPr>
+              </a:p>
+              <a:p>
+                <a:pPr marL="0" indent="0">
+                  <a:buNone/>
+                </a:pPr>
+                <a14:m>
+                  <m:oMathPara xmlns:m="http://schemas.openxmlformats.org/officeDocument/2006/math">
+                    <m:oMathParaPr>
+                      <m:jc m:val="centerGroup"/>
+                    </m:oMathParaPr>
+                    <m:oMath xmlns:m="http://schemas.openxmlformats.org/officeDocument/2006/math">
+                      <m:r>
+                        <a:rPr lang="pt-BR" sz="2400" b="0" i="1" smtClean="0">
+                          <a:solidFill>
+                            <a:schemeClr val="accent1"/>
+                          </a:solidFill>
+                          <a:latin typeface="Cambria Math" panose="02040503050406030204" pitchFamily="18" charset="0"/>
+                          <a:cs typeface="Arial" panose="020B0604020202020204" pitchFamily="34" charset="0"/>
+                        </a:rPr>
+                        <m:t>𝑝𝑟𝑜𝑏</m:t>
+                      </m:r>
+                      <m:d>
+                        <m:dPr>
+                          <m:ctrlPr>
+                            <a:rPr lang="pt-BR" sz="2400" b="0" i="1" smtClean="0">
+                              <a:solidFill>
+                                <a:schemeClr val="accent1"/>
+                              </a:solidFill>
+                              <a:latin typeface="Cambria Math" panose="02040503050406030204" pitchFamily="18" charset="0"/>
+                              <a:cs typeface="Arial" panose="020B0604020202020204" pitchFamily="34" charset="0"/>
+                            </a:rPr>
+                          </m:ctrlPr>
+                        </m:dPr>
+                        <m:e>
+                          <m:sSubSup>
+                            <m:sSubSupPr>
+                              <m:ctrlPr>
+                                <a:rPr lang="pt-BR" sz="2400" b="0" i="1" smtClean="0">
+                                  <a:solidFill>
+                                    <a:schemeClr val="accent1"/>
+                                  </a:solidFill>
+                                  <a:latin typeface="Cambria Math" panose="02040503050406030204" pitchFamily="18" charset="0"/>
+                                  <a:cs typeface="Arial" panose="020B0604020202020204" pitchFamily="34" charset="0"/>
+                                </a:rPr>
+                              </m:ctrlPr>
+                            </m:sSubSupPr>
+                            <m:e>
+                              <m:r>
+                                <a:rPr lang="pt-BR" sz="2400" b="0" i="1" smtClean="0">
+                                  <a:solidFill>
+                                    <a:schemeClr val="accent1"/>
+                                  </a:solidFill>
+                                  <a:latin typeface="Cambria Math" panose="02040503050406030204" pitchFamily="18" charset="0"/>
+                                  <a:cs typeface="Arial" panose="020B0604020202020204" pitchFamily="34" charset="0"/>
+                                </a:rPr>
+                                <m:t>𝑤</m:t>
+                              </m:r>
+                            </m:e>
+                            <m:sub>
+                              <m:r>
+                                <a:rPr lang="pt-BR" sz="2400" b="0" i="1" smtClean="0">
+                                  <a:solidFill>
+                                    <a:schemeClr val="accent1"/>
+                                  </a:solidFill>
+                                  <a:latin typeface="Cambria Math" panose="02040503050406030204" pitchFamily="18" charset="0"/>
+                                  <a:cs typeface="Arial" panose="020B0604020202020204" pitchFamily="34" charset="0"/>
+                                </a:rPr>
+                                <m:t>𝑇</m:t>
+                              </m:r>
+                            </m:sub>
+                            <m:sup/>
+                          </m:sSubSup>
+                          <m:r>
+                            <a:rPr lang="pt-BR" sz="2400" b="0" i="1" smtClean="0">
+                              <a:solidFill>
+                                <a:schemeClr val="accent1"/>
+                              </a:solidFill>
+                              <a:latin typeface="Cambria Math" panose="02040503050406030204" pitchFamily="18" charset="0"/>
+                              <a:cs typeface="Arial" panose="020B0604020202020204" pitchFamily="34" charset="0"/>
+                            </a:rPr>
+                            <m:t>|</m:t>
+                          </m:r>
+                          <m:sSubSup>
+                            <m:sSubSupPr>
+                              <m:ctrlPr>
+                                <a:rPr lang="pt-BR" sz="2400" i="1">
+                                  <a:solidFill>
+                                    <a:schemeClr val="accent1"/>
+                                  </a:solidFill>
+                                  <a:latin typeface="Cambria Math" panose="02040503050406030204" pitchFamily="18" charset="0"/>
+                                  <a:cs typeface="Arial" panose="020B0604020202020204" pitchFamily="34" charset="0"/>
+                                </a:rPr>
+                              </m:ctrlPr>
+                            </m:sSubSupPr>
+                            <m:e>
+                              <m:r>
+                                <a:rPr lang="pt-BR" sz="2400" i="1">
+                                  <a:solidFill>
+                                    <a:schemeClr val="accent1"/>
+                                  </a:solidFill>
+                                  <a:latin typeface="Cambria Math" panose="02040503050406030204" pitchFamily="18" charset="0"/>
+                                  <a:cs typeface="Arial" panose="020B0604020202020204" pitchFamily="34" charset="0"/>
+                                </a:rPr>
+                                <m:t>𝑤</m:t>
+                              </m:r>
+                            </m:e>
+                            <m:sub>
+                              <m:r>
+                                <a:rPr lang="pt-BR" sz="2400" b="0" i="1" smtClean="0">
+                                  <a:solidFill>
+                                    <a:schemeClr val="accent1"/>
+                                  </a:solidFill>
+                                  <a:latin typeface="Cambria Math" panose="02040503050406030204" pitchFamily="18" charset="0"/>
+                                  <a:cs typeface="Arial" panose="020B0604020202020204" pitchFamily="34" charset="0"/>
+                                </a:rPr>
+                                <m:t>𝑇</m:t>
+                              </m:r>
+                            </m:sub>
+                            <m:sup>
+                              <m:r>
+                                <a:rPr lang="pt-BR" sz="2400" b="0" i="1" smtClean="0">
+                                  <a:solidFill>
+                                    <a:schemeClr val="accent1"/>
+                                  </a:solidFill>
+                                  <a:latin typeface="Cambria Math" panose="02040503050406030204" pitchFamily="18" charset="0"/>
+                                  <a:cs typeface="Arial" panose="020B0604020202020204" pitchFamily="34" charset="0"/>
+                                </a:rPr>
+                                <m:t>𝑇</m:t>
+                              </m:r>
+                              <m:r>
+                                <a:rPr lang="pt-BR" sz="2400" b="0" i="1" smtClean="0">
+                                  <a:solidFill>
+                                    <a:schemeClr val="accent1"/>
+                                  </a:solidFill>
+                                  <a:latin typeface="Cambria Math" panose="02040503050406030204" pitchFamily="18" charset="0"/>
+                                  <a:cs typeface="Arial" panose="020B0604020202020204" pitchFamily="34" charset="0"/>
+                                </a:rPr>
+                                <m:t>−1</m:t>
+                              </m:r>
+                            </m:sup>
+                          </m:sSubSup>
+                        </m:e>
+                      </m:d>
+                      <m:r>
+                        <a:rPr lang="pt-BR" sz="2400" b="0" i="1" smtClean="0">
+                          <a:solidFill>
+                            <a:schemeClr val="accent1"/>
+                          </a:solidFill>
+                          <a:latin typeface="Cambria Math" panose="02040503050406030204" pitchFamily="18" charset="0"/>
+                          <a:ea typeface="Cambria Math" panose="02040503050406030204" pitchFamily="18" charset="0"/>
+                          <a:cs typeface="Arial" panose="020B0604020202020204" pitchFamily="34" charset="0"/>
+                        </a:rPr>
+                        <m:t>≈</m:t>
+                      </m:r>
+                      <m:r>
+                        <a:rPr lang="pt-BR" sz="2400" i="1">
+                          <a:solidFill>
+                            <a:schemeClr val="accent1"/>
+                          </a:solidFill>
+                          <a:latin typeface="Cambria Math" panose="02040503050406030204" pitchFamily="18" charset="0"/>
+                          <a:cs typeface="Arial" panose="020B0604020202020204" pitchFamily="34" charset="0"/>
+                        </a:rPr>
+                        <m:t>𝑝𝑟𝑜𝑏</m:t>
+                      </m:r>
+                      <m:d>
+                        <m:dPr>
+                          <m:ctrlPr>
+                            <a:rPr lang="pt-BR" sz="2400" i="1">
+                              <a:solidFill>
+                                <a:schemeClr val="accent1"/>
+                              </a:solidFill>
+                              <a:latin typeface="Cambria Math" panose="02040503050406030204" pitchFamily="18" charset="0"/>
+                              <a:cs typeface="Arial" panose="020B0604020202020204" pitchFamily="34" charset="0"/>
+                            </a:rPr>
+                          </m:ctrlPr>
+                        </m:dPr>
+                        <m:e>
+                          <m:sSubSup>
+                            <m:sSubSupPr>
+                              <m:ctrlPr>
+                                <a:rPr lang="pt-BR" sz="2400" i="1">
+                                  <a:solidFill>
+                                    <a:schemeClr val="accent1"/>
+                                  </a:solidFill>
+                                  <a:latin typeface="Cambria Math" panose="02040503050406030204" pitchFamily="18" charset="0"/>
+                                  <a:cs typeface="Arial" panose="020B0604020202020204" pitchFamily="34" charset="0"/>
+                                </a:rPr>
+                              </m:ctrlPr>
+                            </m:sSubSupPr>
+                            <m:e>
+                              <m:r>
+                                <a:rPr lang="pt-BR" sz="2400" i="1">
+                                  <a:solidFill>
+                                    <a:schemeClr val="accent1"/>
+                                  </a:solidFill>
+                                  <a:latin typeface="Cambria Math" panose="02040503050406030204" pitchFamily="18" charset="0"/>
+                                  <a:cs typeface="Arial" panose="020B0604020202020204" pitchFamily="34" charset="0"/>
+                                </a:rPr>
+                                <m:t>𝑤</m:t>
+                              </m:r>
+                            </m:e>
+                            <m:sub>
+                              <m:r>
+                                <a:rPr lang="pt-BR" sz="2400" b="0" i="1" smtClean="0">
+                                  <a:solidFill>
+                                    <a:schemeClr val="accent1"/>
+                                  </a:solidFill>
+                                  <a:latin typeface="Cambria Math" panose="02040503050406030204" pitchFamily="18" charset="0"/>
+                                  <a:cs typeface="Arial" panose="020B0604020202020204" pitchFamily="34" charset="0"/>
+                                </a:rPr>
+                                <m:t>𝑇</m:t>
+                              </m:r>
+                            </m:sub>
+                            <m:sup/>
+                          </m:sSubSup>
+                          <m:r>
+                            <a:rPr lang="pt-BR" sz="2400" i="1">
+                              <a:solidFill>
+                                <a:schemeClr val="accent1"/>
+                              </a:solidFill>
+                              <a:latin typeface="Cambria Math" panose="02040503050406030204" pitchFamily="18" charset="0"/>
+                              <a:cs typeface="Arial" panose="020B0604020202020204" pitchFamily="34" charset="0"/>
+                            </a:rPr>
+                            <m:t>|</m:t>
+                          </m:r>
+                          <m:sSubSup>
+                            <m:sSubSupPr>
+                              <m:ctrlPr>
+                                <a:rPr lang="pt-BR" sz="2400" i="1">
+                                  <a:solidFill>
+                                    <a:schemeClr val="accent1"/>
+                                  </a:solidFill>
+                                  <a:latin typeface="Cambria Math" panose="02040503050406030204" pitchFamily="18" charset="0"/>
+                                  <a:cs typeface="Arial" panose="020B0604020202020204" pitchFamily="34" charset="0"/>
+                                </a:rPr>
+                              </m:ctrlPr>
+                            </m:sSubSupPr>
+                            <m:e>
+                              <m:r>
+                                <a:rPr lang="pt-BR" sz="2400" i="1">
+                                  <a:solidFill>
+                                    <a:schemeClr val="accent1"/>
+                                  </a:solidFill>
+                                  <a:latin typeface="Cambria Math" panose="02040503050406030204" pitchFamily="18" charset="0"/>
+                                  <a:cs typeface="Arial" panose="020B0604020202020204" pitchFamily="34" charset="0"/>
+                                </a:rPr>
+                                <m:t>𝑤</m:t>
+                              </m:r>
+                            </m:e>
+                            <m:sub>
+                              <m:r>
+                                <a:rPr lang="pt-BR" sz="2400" b="0" i="1" smtClean="0">
+                                  <a:solidFill>
+                                    <a:schemeClr val="accent1"/>
+                                  </a:solidFill>
+                                  <a:latin typeface="Cambria Math" panose="02040503050406030204" pitchFamily="18" charset="0"/>
+                                  <a:cs typeface="Arial" panose="020B0604020202020204" pitchFamily="34" charset="0"/>
+                                </a:rPr>
+                                <m:t>𝑇</m:t>
+                              </m:r>
+                              <m:r>
+                                <a:rPr lang="pt-BR" sz="2400" b="0" i="1" smtClean="0">
+                                  <a:solidFill>
+                                    <a:schemeClr val="accent1"/>
+                                  </a:solidFill>
+                                  <a:latin typeface="Cambria Math" panose="02040503050406030204" pitchFamily="18" charset="0"/>
+                                  <a:cs typeface="Arial" panose="020B0604020202020204" pitchFamily="34" charset="0"/>
+                                </a:rPr>
+                                <m:t>−</m:t>
+                              </m:r>
+                              <m:r>
+                                <a:rPr lang="pt-BR" sz="2400" b="0" i="1" smtClean="0">
+                                  <a:solidFill>
+                                    <a:schemeClr val="accent1"/>
+                                  </a:solidFill>
+                                  <a:latin typeface="Cambria Math" panose="02040503050406030204" pitchFamily="18" charset="0"/>
+                                  <a:cs typeface="Arial" panose="020B0604020202020204" pitchFamily="34" charset="0"/>
+                                </a:rPr>
+                                <m:t>𝑛</m:t>
+                              </m:r>
+                              <m:r>
+                                <a:rPr lang="pt-BR" sz="2400" b="0" i="1" smtClean="0">
+                                  <a:solidFill>
+                                    <a:schemeClr val="accent1"/>
+                                  </a:solidFill>
+                                  <a:latin typeface="Cambria Math" panose="02040503050406030204" pitchFamily="18" charset="0"/>
+                                  <a:cs typeface="Arial" panose="020B0604020202020204" pitchFamily="34" charset="0"/>
+                                </a:rPr>
+                                <m:t>−1</m:t>
+                              </m:r>
+                            </m:sub>
+                            <m:sup>
+                              <m:r>
+                                <a:rPr lang="pt-BR" sz="2400" b="0" i="1" smtClean="0">
+                                  <a:solidFill>
+                                    <a:schemeClr val="accent1"/>
+                                  </a:solidFill>
+                                  <a:latin typeface="Cambria Math" panose="02040503050406030204" pitchFamily="18" charset="0"/>
+                                  <a:cs typeface="Arial" panose="020B0604020202020204" pitchFamily="34" charset="0"/>
+                                </a:rPr>
+                                <m:t>𝑇</m:t>
+                              </m:r>
+                              <m:r>
+                                <a:rPr lang="pt-BR" sz="2400" i="1">
+                                  <a:solidFill>
+                                    <a:schemeClr val="accent1"/>
+                                  </a:solidFill>
+                                  <a:latin typeface="Cambria Math" panose="02040503050406030204" pitchFamily="18" charset="0"/>
+                                  <a:cs typeface="Arial" panose="020B0604020202020204" pitchFamily="34" charset="0"/>
+                                </a:rPr>
+                                <m:t>−1</m:t>
+                              </m:r>
+                            </m:sup>
+                          </m:sSubSup>
+                        </m:e>
+                      </m:d>
+                    </m:oMath>
+                  </m:oMathPara>
+                </a14:m>
+                <a:endParaRPr lang="pt-BR" sz="2400" dirty="0">
+                  <a:solidFill>
+                    <a:schemeClr val="accent1"/>
+                  </a:solidFill>
+                  <a:latin typeface="Arial" panose="020B0604020202020204" pitchFamily="34" charset="0"/>
+                  <a:cs typeface="Arial" panose="020B0604020202020204" pitchFamily="34" charset="0"/>
+                </a:endParaRPr>
+              </a:p>
+              <a:p>
+                <a:pPr marL="0" indent="0">
+                  <a:buNone/>
+                </a:pPr>
+                <a:endParaRPr lang="pt-BR" sz="2400" dirty="0">
+                  <a:solidFill>
+                    <a:schemeClr val="accent1"/>
+                  </a:solidFill>
+                  <a:latin typeface="Arial" panose="020B0604020202020204" pitchFamily="34" charset="0"/>
+                  <a:cs typeface="Arial" panose="020B0604020202020204" pitchFamily="34" charset="0"/>
+                </a:endParaRPr>
+              </a:p>
+              <a:p>
+                <a:pPr marL="0" indent="0">
+                  <a:buNone/>
+                </a:pPr>
+                <a:r>
+                  <a:rPr lang="pt-BR" sz="2400" dirty="0">
+                    <a:solidFill>
+                      <a:schemeClr val="accent1"/>
+                    </a:solidFill>
+                    <a:latin typeface="Arial" panose="020B0604020202020204" pitchFamily="34" charset="0"/>
+                    <a:cs typeface="Arial" panose="020B0604020202020204" pitchFamily="34" charset="0"/>
+                  </a:rPr>
+                  <a:t>=&gt; Indicação de que em textos os contextos/palavras mais recentes tendem a importar mais</a:t>
+                </a:r>
+              </a:p>
+            </p:txBody>
+          </p:sp>
+        </mc:Choice>
+        <mc:Fallback>
+          <p:sp>
+            <p:nvSpPr>
+              <p:cNvPr id="3" name="Espaço Reservado para Conteúdo 3">
+                <a:extLst>
+                  <a:ext uri="{FF2B5EF4-FFF2-40B4-BE49-F238E27FC236}">
+                    <a16:creationId xmlns:a16="http://schemas.microsoft.com/office/drawing/2014/main" id="{844E510C-6C66-9514-573E-0EC1B83DF3EA}"/>
+                  </a:ext>
+                </a:extLst>
+              </p:cNvPr>
+              <p:cNvSpPr txBox="1">
+                <a:spLocks noRot="1" noChangeAspect="1" noMove="1" noResize="1" noEditPoints="1" noAdjustHandles="1" noChangeArrowheads="1" noChangeShapeType="1" noTextEdit="1"/>
+              </p:cNvSpPr>
+              <p:nvPr/>
+            </p:nvSpPr>
+            <p:spPr>
+              <a:xfrm>
+                <a:off x="176169" y="1502263"/>
+                <a:ext cx="11694252" cy="5112456"/>
+              </a:xfrm>
+              <a:prstGeom prst="rect">
+                <a:avLst/>
+              </a:prstGeom>
+              <a:blipFill>
+                <a:blip r:embed="rId3"/>
+                <a:stretch>
+                  <a:fillRect l="-834" t="-2265" r="-469"/>
+                </a:stretch>
+              </a:blipFill>
+            </p:spPr>
+            <p:txBody>
+              <a:bodyPr/>
+              <a:lstStyle/>
+              <a:p>
+                <a:r>
+                  <a:rPr lang="pt-BR">
+                    <a:noFill/>
+                  </a:rPr>
+                  <a:t> </a:t>
+                </a:r>
+              </a:p>
+            </p:txBody>
+          </p:sp>
+        </mc:Fallback>
+      </mc:AlternateContent>
     </p:spTree>
     <p:extLst>
       <p:ext uri="{BB962C8B-B14F-4D97-AF65-F5344CB8AC3E}">
-        <p14:creationId xmlns:p14="http://schemas.microsoft.com/office/powerpoint/2010/main" val="2243494996"/>
+        <p14:creationId xmlns:p14="http://schemas.microsoft.com/office/powerpoint/2010/main" val="1170569614"/>
       </p:ext>
     </p:extLst>
   </p:cSld>
@@ -11893,6 +12663,620 @@
           <p:cNvPr id="2" name="Título 1">
             <a:extLst>
               <a:ext uri="{FF2B5EF4-FFF2-40B4-BE49-F238E27FC236}">
+                <a16:creationId xmlns:a16="http://schemas.microsoft.com/office/drawing/2014/main" id="{6719F29B-F233-48AF-8261-F33A4E079E3E}"/>
+              </a:ext>
+            </a:extLst>
+          </p:cNvPr>
+          <p:cNvSpPr>
+            <a:spLocks noGrp="1"/>
+          </p:cNvSpPr>
+          <p:nvPr>
+            <p:ph type="title"/>
+          </p:nvPr>
+        </p:nvSpPr>
+        <p:spPr>
+          <a:xfrm>
+            <a:off x="176169" y="243281"/>
+            <a:ext cx="6401988" cy="729788"/>
+          </a:xfrm>
+        </p:spPr>
+        <p:txBody>
+          <a:bodyPr rtlCol="0"/>
+          <a:lstStyle/>
+          <a:p>
+            <a:pPr algn="l" rtl="0"/>
+            <a:r>
+              <a:rPr lang="pt-BR" dirty="0"/>
+              <a:t>Contribuições do artigo</a:t>
+            </a:r>
+          </a:p>
+        </p:txBody>
+      </p:sp>
+      <p:sp>
+        <p:nvSpPr>
+          <p:cNvPr id="4" name="Espaço Reservado para o Número do Slide 3">
+            <a:extLst>
+              <a:ext uri="{FF2B5EF4-FFF2-40B4-BE49-F238E27FC236}">
+                <a16:creationId xmlns:a16="http://schemas.microsoft.com/office/drawing/2014/main" id="{328F602C-7F98-4C02-99D4-ED65E00D66A4}"/>
+              </a:ext>
+            </a:extLst>
+          </p:cNvPr>
+          <p:cNvSpPr>
+            <a:spLocks noGrp="1"/>
+          </p:cNvSpPr>
+          <p:nvPr>
+            <p:ph type="sldNum" sz="quarter" idx="12"/>
+          </p:nvPr>
+        </p:nvSpPr>
+        <p:spPr>
+          <a:xfrm>
+            <a:off x="8610600" y="6356350"/>
+            <a:ext cx="2743200" cy="365125"/>
+          </a:xfrm>
+        </p:spPr>
+        <p:txBody>
+          <a:bodyPr rtlCol="0"/>
+          <a:lstStyle/>
+          <a:p>
+            <a:pPr rtl="0"/>
+            <a:fld id="{19B51A1E-902D-48AF-9020-955120F399B6}" type="slidenum">
+              <a:rPr lang="pt-BR" smtClean="0"/>
+              <a:pPr rtl="0"/>
+              <a:t>5</a:t>
+            </a:fld>
+            <a:endParaRPr lang="pt-BR"/>
+          </a:p>
+        </p:txBody>
+      </p:sp>
+      <p:sp>
+        <p:nvSpPr>
+          <p:cNvPr id="20" name="Espaço Reservado para Conteúdo 3">
+            <a:extLst>
+              <a:ext uri="{FF2B5EF4-FFF2-40B4-BE49-F238E27FC236}">
+                <a16:creationId xmlns:a16="http://schemas.microsoft.com/office/drawing/2014/main" id="{A26C9687-67C8-0FE8-0794-47272524905A}"/>
+              </a:ext>
+            </a:extLst>
+          </p:cNvPr>
+          <p:cNvSpPr txBox="1">
+            <a:spLocks/>
+          </p:cNvSpPr>
+          <p:nvPr/>
+        </p:nvSpPr>
+        <p:spPr>
+          <a:xfrm>
+            <a:off x="243282" y="2088859"/>
+            <a:ext cx="11694252" cy="4353885"/>
+          </a:xfrm>
+          <a:prstGeom prst="rect">
+            <a:avLst/>
+          </a:prstGeom>
+        </p:spPr>
+        <p:txBody>
+          <a:bodyPr rtlCol="0">
+            <a:normAutofit/>
+          </a:bodyPr>
+          <a:lstStyle>
+            <a:lvl1pPr marL="228600" indent="-228600" algn="l" defTabSz="914400" rtl="0" eaLnBrk="1" latinLnBrk="0" hangingPunct="1">
+              <a:lnSpc>
+                <a:spcPct val="90000"/>
+              </a:lnSpc>
+              <a:spcBef>
+                <a:spcPts val="1000"/>
+              </a:spcBef>
+              <a:buFont typeface="Arial" panose="020B0604020202020204" pitchFamily="34" charset="0"/>
+              <a:buChar char="•"/>
+              <a:defRPr sz="2800" kern="1200">
+                <a:solidFill>
+                  <a:schemeClr val="tx1"/>
+                </a:solidFill>
+                <a:latin typeface="+mn-lt"/>
+                <a:ea typeface="+mn-ea"/>
+                <a:cs typeface="+mn-cs"/>
+              </a:defRPr>
+            </a:lvl1pPr>
+            <a:lvl2pPr marL="685800" indent="-228600" algn="l" defTabSz="914400" rtl="0" eaLnBrk="1" latinLnBrk="0" hangingPunct="1">
+              <a:lnSpc>
+                <a:spcPct val="90000"/>
+              </a:lnSpc>
+              <a:spcBef>
+                <a:spcPts val="500"/>
+              </a:spcBef>
+              <a:buFont typeface="Arial" panose="020B0604020202020204" pitchFamily="34" charset="0"/>
+              <a:buChar char="•"/>
+              <a:defRPr sz="2400" kern="1200">
+                <a:solidFill>
+                  <a:schemeClr val="tx1"/>
+                </a:solidFill>
+                <a:latin typeface="+mn-lt"/>
+                <a:ea typeface="+mn-ea"/>
+                <a:cs typeface="+mn-cs"/>
+              </a:defRPr>
+            </a:lvl2pPr>
+            <a:lvl3pPr marL="1143000" indent="-228600" algn="l" defTabSz="914400" rtl="0" eaLnBrk="1" latinLnBrk="0" hangingPunct="1">
+              <a:lnSpc>
+                <a:spcPct val="90000"/>
+              </a:lnSpc>
+              <a:spcBef>
+                <a:spcPts val="500"/>
+              </a:spcBef>
+              <a:buFont typeface="Arial" panose="020B0604020202020204" pitchFamily="34" charset="0"/>
+              <a:buChar char="•"/>
+              <a:defRPr sz="2000" kern="1200">
+                <a:solidFill>
+                  <a:schemeClr val="tx1"/>
+                </a:solidFill>
+                <a:latin typeface="+mn-lt"/>
+                <a:ea typeface="+mn-ea"/>
+                <a:cs typeface="+mn-cs"/>
+              </a:defRPr>
+            </a:lvl3pPr>
+            <a:lvl4pPr marL="1600200" indent="-228600" algn="l" defTabSz="914400" rtl="0" eaLnBrk="1" latinLnBrk="0" hangingPunct="1">
+              <a:lnSpc>
+                <a:spcPct val="90000"/>
+              </a:lnSpc>
+              <a:spcBef>
+                <a:spcPts val="500"/>
+              </a:spcBef>
+              <a:buFont typeface="Arial" panose="020B0604020202020204" pitchFamily="34" charset="0"/>
+              <a:buChar char="•"/>
+              <a:defRPr sz="1800" kern="1200">
+                <a:solidFill>
+                  <a:schemeClr val="tx1"/>
+                </a:solidFill>
+                <a:latin typeface="+mn-lt"/>
+                <a:ea typeface="+mn-ea"/>
+                <a:cs typeface="+mn-cs"/>
+              </a:defRPr>
+            </a:lvl4pPr>
+            <a:lvl5pPr marL="2057400" indent="-228600" algn="l" defTabSz="914400" rtl="0" eaLnBrk="1" latinLnBrk="0" hangingPunct="1">
+              <a:lnSpc>
+                <a:spcPct val="90000"/>
+              </a:lnSpc>
+              <a:spcBef>
+                <a:spcPts val="500"/>
+              </a:spcBef>
+              <a:buFont typeface="Arial" panose="020B0604020202020204" pitchFamily="34" charset="0"/>
+              <a:buChar char="•"/>
+              <a:defRPr sz="1800" kern="1200">
+                <a:solidFill>
+                  <a:schemeClr val="tx1"/>
+                </a:solidFill>
+                <a:latin typeface="+mn-lt"/>
+                <a:ea typeface="+mn-ea"/>
+                <a:cs typeface="+mn-cs"/>
+              </a:defRPr>
+            </a:lvl5pPr>
+            <a:lvl6pPr marL="2514600" indent="-228600" algn="l" defTabSz="914400" rtl="0" eaLnBrk="1" latinLnBrk="0" hangingPunct="1">
+              <a:lnSpc>
+                <a:spcPct val="90000"/>
+              </a:lnSpc>
+              <a:spcBef>
+                <a:spcPts val="500"/>
+              </a:spcBef>
+              <a:buFont typeface="Arial" panose="020B0604020202020204" pitchFamily="34" charset="0"/>
+              <a:buChar char="•"/>
+              <a:defRPr sz="1800" kern="1200">
+                <a:solidFill>
+                  <a:schemeClr val="tx1"/>
+                </a:solidFill>
+                <a:latin typeface="+mn-lt"/>
+                <a:ea typeface="+mn-ea"/>
+                <a:cs typeface="+mn-cs"/>
+              </a:defRPr>
+            </a:lvl6pPr>
+            <a:lvl7pPr marL="2971800" indent="-228600" algn="l" defTabSz="914400" rtl="0" eaLnBrk="1" latinLnBrk="0" hangingPunct="1">
+              <a:lnSpc>
+                <a:spcPct val="90000"/>
+              </a:lnSpc>
+              <a:spcBef>
+                <a:spcPts val="500"/>
+              </a:spcBef>
+              <a:buFont typeface="Arial" panose="020B0604020202020204" pitchFamily="34" charset="0"/>
+              <a:buChar char="•"/>
+              <a:defRPr sz="1800" kern="1200">
+                <a:solidFill>
+                  <a:schemeClr val="tx1"/>
+                </a:solidFill>
+                <a:latin typeface="+mn-lt"/>
+                <a:ea typeface="+mn-ea"/>
+                <a:cs typeface="+mn-cs"/>
+              </a:defRPr>
+            </a:lvl7pPr>
+            <a:lvl8pPr marL="3429000" indent="-228600" algn="l" defTabSz="914400" rtl="0" eaLnBrk="1" latinLnBrk="0" hangingPunct="1">
+              <a:lnSpc>
+                <a:spcPct val="90000"/>
+              </a:lnSpc>
+              <a:spcBef>
+                <a:spcPts val="500"/>
+              </a:spcBef>
+              <a:buFont typeface="Arial" panose="020B0604020202020204" pitchFamily="34" charset="0"/>
+              <a:buChar char="•"/>
+              <a:defRPr sz="1800" kern="1200">
+                <a:solidFill>
+                  <a:schemeClr val="tx1"/>
+                </a:solidFill>
+                <a:latin typeface="+mn-lt"/>
+                <a:ea typeface="+mn-ea"/>
+                <a:cs typeface="+mn-cs"/>
+              </a:defRPr>
+            </a:lvl8pPr>
+            <a:lvl9pPr marL="3886200" indent="-228600" algn="l" defTabSz="914400" rtl="0" eaLnBrk="1" latinLnBrk="0" hangingPunct="1">
+              <a:lnSpc>
+                <a:spcPct val="90000"/>
+              </a:lnSpc>
+              <a:spcBef>
+                <a:spcPts val="500"/>
+              </a:spcBef>
+              <a:buFont typeface="Arial" panose="020B0604020202020204" pitchFamily="34" charset="0"/>
+              <a:buChar char="•"/>
+              <a:defRPr sz="1800" kern="1200">
+                <a:solidFill>
+                  <a:schemeClr val="tx1"/>
+                </a:solidFill>
+                <a:latin typeface="+mn-lt"/>
+                <a:ea typeface="+mn-ea"/>
+                <a:cs typeface="+mn-cs"/>
+              </a:defRPr>
+            </a:lvl9pPr>
+          </a:lstStyle>
+          <a:p>
+            <a:pPr marL="0" indent="0">
+              <a:buNone/>
+            </a:pPr>
+            <a:endParaRPr lang="pt-BR" sz="2400" dirty="0">
+              <a:solidFill>
+                <a:schemeClr val="accent1"/>
+              </a:solidFill>
+              <a:latin typeface="Arial" panose="020B0604020202020204" pitchFamily="34" charset="0"/>
+              <a:cs typeface="Arial" panose="020B0604020202020204" pitchFamily="34" charset="0"/>
+            </a:endParaRPr>
+          </a:p>
+        </p:txBody>
+      </p:sp>
+      <p:sp>
+        <p:nvSpPr>
+          <p:cNvPr id="6" name="Espaço Reservado para Conteúdo 3">
+            <a:extLst>
+              <a:ext uri="{FF2B5EF4-FFF2-40B4-BE49-F238E27FC236}">
+                <a16:creationId xmlns:a16="http://schemas.microsoft.com/office/drawing/2014/main" id="{01D5BDAE-396B-7FC5-DCF9-C8B3895676EC}"/>
+              </a:ext>
+            </a:extLst>
+          </p:cNvPr>
+          <p:cNvSpPr txBox="1">
+            <a:spLocks/>
+          </p:cNvSpPr>
+          <p:nvPr/>
+        </p:nvSpPr>
+        <p:spPr>
+          <a:xfrm>
+            <a:off x="176169" y="1502263"/>
+            <a:ext cx="11694252" cy="5010680"/>
+          </a:xfrm>
+          <a:prstGeom prst="rect">
+            <a:avLst/>
+          </a:prstGeom>
+        </p:spPr>
+        <p:txBody>
+          <a:bodyPr rtlCol="0">
+            <a:normAutofit/>
+          </a:bodyPr>
+          <a:lstStyle>
+            <a:lvl1pPr marL="228600" indent="-228600" algn="l" defTabSz="914400" rtl="0" eaLnBrk="1" latinLnBrk="0" hangingPunct="1">
+              <a:lnSpc>
+                <a:spcPct val="90000"/>
+              </a:lnSpc>
+              <a:spcBef>
+                <a:spcPts val="1000"/>
+              </a:spcBef>
+              <a:buFont typeface="Arial" panose="020B0604020202020204" pitchFamily="34" charset="0"/>
+              <a:buChar char="•"/>
+              <a:defRPr sz="2800" kern="1200">
+                <a:solidFill>
+                  <a:schemeClr val="tx1"/>
+                </a:solidFill>
+                <a:latin typeface="+mn-lt"/>
+                <a:ea typeface="+mn-ea"/>
+                <a:cs typeface="+mn-cs"/>
+              </a:defRPr>
+            </a:lvl1pPr>
+            <a:lvl2pPr marL="685800" indent="-228600" algn="l" defTabSz="914400" rtl="0" eaLnBrk="1" latinLnBrk="0" hangingPunct="1">
+              <a:lnSpc>
+                <a:spcPct val="90000"/>
+              </a:lnSpc>
+              <a:spcBef>
+                <a:spcPts val="500"/>
+              </a:spcBef>
+              <a:buFont typeface="Arial" panose="020B0604020202020204" pitchFamily="34" charset="0"/>
+              <a:buChar char="•"/>
+              <a:defRPr sz="2400" kern="1200">
+                <a:solidFill>
+                  <a:schemeClr val="tx1"/>
+                </a:solidFill>
+                <a:latin typeface="+mn-lt"/>
+                <a:ea typeface="+mn-ea"/>
+                <a:cs typeface="+mn-cs"/>
+              </a:defRPr>
+            </a:lvl2pPr>
+            <a:lvl3pPr marL="1143000" indent="-228600" algn="l" defTabSz="914400" rtl="0" eaLnBrk="1" latinLnBrk="0" hangingPunct="1">
+              <a:lnSpc>
+                <a:spcPct val="90000"/>
+              </a:lnSpc>
+              <a:spcBef>
+                <a:spcPts val="500"/>
+              </a:spcBef>
+              <a:buFont typeface="Arial" panose="020B0604020202020204" pitchFamily="34" charset="0"/>
+              <a:buChar char="•"/>
+              <a:defRPr sz="2000" kern="1200">
+                <a:solidFill>
+                  <a:schemeClr val="tx1"/>
+                </a:solidFill>
+                <a:latin typeface="+mn-lt"/>
+                <a:ea typeface="+mn-ea"/>
+                <a:cs typeface="+mn-cs"/>
+              </a:defRPr>
+            </a:lvl3pPr>
+            <a:lvl4pPr marL="1600200" indent="-228600" algn="l" defTabSz="914400" rtl="0" eaLnBrk="1" latinLnBrk="0" hangingPunct="1">
+              <a:lnSpc>
+                <a:spcPct val="90000"/>
+              </a:lnSpc>
+              <a:spcBef>
+                <a:spcPts val="500"/>
+              </a:spcBef>
+              <a:buFont typeface="Arial" panose="020B0604020202020204" pitchFamily="34" charset="0"/>
+              <a:buChar char="•"/>
+              <a:defRPr sz="1800" kern="1200">
+                <a:solidFill>
+                  <a:schemeClr val="tx1"/>
+                </a:solidFill>
+                <a:latin typeface="+mn-lt"/>
+                <a:ea typeface="+mn-ea"/>
+                <a:cs typeface="+mn-cs"/>
+              </a:defRPr>
+            </a:lvl4pPr>
+            <a:lvl5pPr marL="2057400" indent="-228600" algn="l" defTabSz="914400" rtl="0" eaLnBrk="1" latinLnBrk="0" hangingPunct="1">
+              <a:lnSpc>
+                <a:spcPct val="90000"/>
+              </a:lnSpc>
+              <a:spcBef>
+                <a:spcPts val="500"/>
+              </a:spcBef>
+              <a:buFont typeface="Arial" panose="020B0604020202020204" pitchFamily="34" charset="0"/>
+              <a:buChar char="•"/>
+              <a:defRPr sz="1800" kern="1200">
+                <a:solidFill>
+                  <a:schemeClr val="tx1"/>
+                </a:solidFill>
+                <a:latin typeface="+mn-lt"/>
+                <a:ea typeface="+mn-ea"/>
+                <a:cs typeface="+mn-cs"/>
+              </a:defRPr>
+            </a:lvl5pPr>
+            <a:lvl6pPr marL="2514600" indent="-228600" algn="l" defTabSz="914400" rtl="0" eaLnBrk="1" latinLnBrk="0" hangingPunct="1">
+              <a:lnSpc>
+                <a:spcPct val="90000"/>
+              </a:lnSpc>
+              <a:spcBef>
+                <a:spcPts val="500"/>
+              </a:spcBef>
+              <a:buFont typeface="Arial" panose="020B0604020202020204" pitchFamily="34" charset="0"/>
+              <a:buChar char="•"/>
+              <a:defRPr sz="1800" kern="1200">
+                <a:solidFill>
+                  <a:schemeClr val="tx1"/>
+                </a:solidFill>
+                <a:latin typeface="+mn-lt"/>
+                <a:ea typeface="+mn-ea"/>
+                <a:cs typeface="+mn-cs"/>
+              </a:defRPr>
+            </a:lvl6pPr>
+            <a:lvl7pPr marL="2971800" indent="-228600" algn="l" defTabSz="914400" rtl="0" eaLnBrk="1" latinLnBrk="0" hangingPunct="1">
+              <a:lnSpc>
+                <a:spcPct val="90000"/>
+              </a:lnSpc>
+              <a:spcBef>
+                <a:spcPts val="500"/>
+              </a:spcBef>
+              <a:buFont typeface="Arial" panose="020B0604020202020204" pitchFamily="34" charset="0"/>
+              <a:buChar char="•"/>
+              <a:defRPr sz="1800" kern="1200">
+                <a:solidFill>
+                  <a:schemeClr val="tx1"/>
+                </a:solidFill>
+                <a:latin typeface="+mn-lt"/>
+                <a:ea typeface="+mn-ea"/>
+                <a:cs typeface="+mn-cs"/>
+              </a:defRPr>
+            </a:lvl7pPr>
+            <a:lvl8pPr marL="3429000" indent="-228600" algn="l" defTabSz="914400" rtl="0" eaLnBrk="1" latinLnBrk="0" hangingPunct="1">
+              <a:lnSpc>
+                <a:spcPct val="90000"/>
+              </a:lnSpc>
+              <a:spcBef>
+                <a:spcPts val="500"/>
+              </a:spcBef>
+              <a:buFont typeface="Arial" panose="020B0604020202020204" pitchFamily="34" charset="0"/>
+              <a:buChar char="•"/>
+              <a:defRPr sz="1800" kern="1200">
+                <a:solidFill>
+                  <a:schemeClr val="tx1"/>
+                </a:solidFill>
+                <a:latin typeface="+mn-lt"/>
+                <a:ea typeface="+mn-ea"/>
+                <a:cs typeface="+mn-cs"/>
+              </a:defRPr>
+            </a:lvl8pPr>
+            <a:lvl9pPr marL="3886200" indent="-228600" algn="l" defTabSz="914400" rtl="0" eaLnBrk="1" latinLnBrk="0" hangingPunct="1">
+              <a:lnSpc>
+                <a:spcPct val="90000"/>
+              </a:lnSpc>
+              <a:spcBef>
+                <a:spcPts val="500"/>
+              </a:spcBef>
+              <a:buFont typeface="Arial" panose="020B0604020202020204" pitchFamily="34" charset="0"/>
+              <a:buChar char="•"/>
+              <a:defRPr sz="1800" kern="1200">
+                <a:solidFill>
+                  <a:schemeClr val="tx1"/>
+                </a:solidFill>
+                <a:latin typeface="+mn-lt"/>
+                <a:ea typeface="+mn-ea"/>
+                <a:cs typeface="+mn-cs"/>
+              </a:defRPr>
+            </a:lvl9pPr>
+          </a:lstStyle>
+          <a:p>
+            <a:pPr marL="457200" indent="-457200">
+              <a:buAutoNum type="arabicPeriod"/>
+            </a:pPr>
+            <a:r>
+              <a:rPr lang="pt-BR" sz="2400" dirty="0">
+                <a:solidFill>
+                  <a:schemeClr val="accent1"/>
+                </a:solidFill>
+                <a:latin typeface="Arial" panose="020B0604020202020204" pitchFamily="34" charset="0"/>
+                <a:cs typeface="Arial" panose="020B0604020202020204" pitchFamily="34" charset="0"/>
+              </a:rPr>
+              <a:t>Proposta e treinamento do GPT-2</a:t>
+            </a:r>
+          </a:p>
+          <a:p>
+            <a:pPr marL="457200" indent="-457200">
+              <a:buAutoNum type="arabicPeriod"/>
+            </a:pPr>
+            <a:endParaRPr lang="pt-BR" sz="2400" dirty="0">
+              <a:solidFill>
+                <a:schemeClr val="accent1"/>
+              </a:solidFill>
+              <a:latin typeface="Arial" panose="020B0604020202020204" pitchFamily="34" charset="0"/>
+              <a:cs typeface="Arial" panose="020B0604020202020204" pitchFamily="34" charset="0"/>
+            </a:endParaRPr>
+          </a:p>
+          <a:p>
+            <a:pPr marL="457200" indent="-457200">
+              <a:buAutoNum type="arabicPeriod"/>
+            </a:pPr>
+            <a:r>
+              <a:rPr lang="pt-BR" sz="2400" dirty="0">
+                <a:solidFill>
+                  <a:schemeClr val="accent1"/>
+                </a:solidFill>
+                <a:latin typeface="Arial" panose="020B0604020202020204" pitchFamily="34" charset="0"/>
+                <a:cs typeface="Arial" panose="020B0604020202020204" pitchFamily="34" charset="0"/>
+              </a:rPr>
+              <a:t>Aplicação do modelo a diversas bases de dados e discussões sobre que tipo de problema essa rede supera o estado da arte.</a:t>
+            </a:r>
+          </a:p>
+          <a:p>
+            <a:pPr marL="457200" indent="-457200">
+              <a:buAutoNum type="arabicPeriod"/>
+            </a:pPr>
+            <a:endParaRPr lang="pt-BR" sz="2400" dirty="0">
+              <a:solidFill>
+                <a:schemeClr val="accent1"/>
+              </a:solidFill>
+              <a:latin typeface="Arial" panose="020B0604020202020204" pitchFamily="34" charset="0"/>
+              <a:cs typeface="Arial" panose="020B0604020202020204" pitchFamily="34" charset="0"/>
+            </a:endParaRPr>
+          </a:p>
+          <a:p>
+            <a:pPr marL="457200" indent="-457200">
+              <a:buAutoNum type="arabicPeriod"/>
+            </a:pPr>
+            <a:r>
+              <a:rPr lang="pt-BR" sz="2400" dirty="0">
+                <a:solidFill>
+                  <a:schemeClr val="accent1"/>
+                </a:solidFill>
+                <a:latin typeface="Arial" panose="020B0604020202020204" pitchFamily="34" charset="0"/>
+                <a:cs typeface="Arial" panose="020B0604020202020204" pitchFamily="34" charset="0"/>
+              </a:rPr>
+              <a:t>Discussões sobre as limitações do modelo. Aborda a questão da generalização versus memorização (</a:t>
+            </a:r>
+            <a:r>
+              <a:rPr lang="pt-BR" sz="2400" dirty="0" err="1">
+                <a:solidFill>
+                  <a:schemeClr val="accent1"/>
+                </a:solidFill>
+                <a:latin typeface="Arial" panose="020B0604020202020204" pitchFamily="34" charset="0"/>
+                <a:cs typeface="Arial" panose="020B0604020202020204" pitchFamily="34" charset="0"/>
+              </a:rPr>
+              <a:t>overlap</a:t>
+            </a:r>
+            <a:r>
+              <a:rPr lang="pt-BR" sz="2400" dirty="0">
+                <a:solidFill>
+                  <a:schemeClr val="accent1"/>
+                </a:solidFill>
+                <a:latin typeface="Arial" panose="020B0604020202020204" pitchFamily="34" charset="0"/>
+                <a:cs typeface="Arial" panose="020B0604020202020204" pitchFamily="34" charset="0"/>
+              </a:rPr>
+              <a:t> de ~1-6% dependendo do teste) e fala de cuidados na curadoria da base.</a:t>
+            </a:r>
+          </a:p>
+          <a:p>
+            <a:pPr marL="457200" indent="-457200">
+              <a:buAutoNum type="arabicPeriod"/>
+            </a:pPr>
+            <a:endParaRPr lang="pt-BR" sz="2400" dirty="0">
+              <a:solidFill>
+                <a:schemeClr val="accent1"/>
+              </a:solidFill>
+              <a:latin typeface="Arial" panose="020B0604020202020204" pitchFamily="34" charset="0"/>
+              <a:cs typeface="Arial" panose="020B0604020202020204" pitchFamily="34" charset="0"/>
+            </a:endParaRPr>
+          </a:p>
+          <a:p>
+            <a:pPr marL="457200" indent="-457200">
+              <a:buAutoNum type="arabicPeriod"/>
+            </a:pPr>
+            <a:r>
+              <a:rPr lang="pt-BR" sz="2400" dirty="0">
+                <a:solidFill>
+                  <a:schemeClr val="accent1"/>
+                </a:solidFill>
+                <a:latin typeface="Arial" panose="020B0604020202020204" pitchFamily="34" charset="0"/>
+                <a:cs typeface="Arial" panose="020B0604020202020204" pitchFamily="34" charset="0"/>
+              </a:rPr>
+              <a:t>Resultados sugerem que a abordagem que tomaram é adequada para resolver diversas tarefas sem a necessidade se supervisão explícita.</a:t>
+            </a:r>
+          </a:p>
+        </p:txBody>
+      </p:sp>
+    </p:spTree>
+    <p:extLst>
+      <p:ext uri="{BB962C8B-B14F-4D97-AF65-F5344CB8AC3E}">
+        <p14:creationId xmlns:p14="http://schemas.microsoft.com/office/powerpoint/2010/main" val="2243494996"/>
+      </p:ext>
+    </p:extLst>
+  </p:cSld>
+  <p:clrMapOvr>
+    <a:masterClrMapping/>
+  </p:clrMapOvr>
+</p:sld>
+</file>
+
+<file path=ppt/slides/slide6.xml><?xml version="1.0" encoding="utf-8"?>
+<p:sld xmlns:a="http://schemas.openxmlformats.org/drawingml/2006/main" xmlns:r="http://schemas.openxmlformats.org/officeDocument/2006/relationships" xmlns:p="http://schemas.openxmlformats.org/presentationml/2006/main">
+  <p:cSld>
+    <p:spTree>
+      <p:nvGrpSpPr>
+        <p:cNvPr id="1" name=""/>
+        <p:cNvGrpSpPr/>
+        <p:nvPr/>
+      </p:nvGrpSpPr>
+      <p:grpSpPr>
+        <a:xfrm>
+          <a:off x="0" y="0"/>
+          <a:ext cx="0" cy="0"/>
+          <a:chOff x="0" y="0"/>
+          <a:chExt cx="0" cy="0"/>
+        </a:xfrm>
+      </p:grpSpPr>
+      <p:sp>
+        <p:nvSpPr>
+          <p:cNvPr id="2" name="Título 1">
+            <a:extLst>
+              <a:ext uri="{FF2B5EF4-FFF2-40B4-BE49-F238E27FC236}">
                 <a16:creationId xmlns:a16="http://schemas.microsoft.com/office/drawing/2014/main" id="{BCCAEE93-8585-46D4-A7EC-F184E317CB2E}"/>
               </a:ext>
             </a:extLst>
@@ -11995,7 +13379,7 @@
             <a:fld id="{B5CEABB6-07DC-46E8-9B57-56EC44A396E5}" type="slidenum">
               <a:rPr lang="pt-BR" smtClean="0"/>
               <a:pPr rtl="0"/>
-              <a:t>5</a:t>
+              <a:t>6</a:t>
             </a:fld>
             <a:endParaRPr lang="pt-BR"/>
           </a:p>
@@ -12806,15 +14190,6 @@
 </file>
 
 <file path=customXml/item1.xml><?xml version="1.0" encoding="utf-8"?>
-<?mso-contentType ?>
-<FormTemplates xmlns="http://schemas.microsoft.com/sharepoint/v3/contenttype/forms">
-  <Display>DocumentLibraryForm</Display>
-  <Edit>DocumentLibraryForm</Edit>
-  <New>DocumentLibraryForm</New>
-</FormTemplates>
-</file>
-
-<file path=customXml/item2.xml><?xml version="1.0" encoding="utf-8"?>
 <p:properties xmlns:p="http://schemas.microsoft.com/office/2006/metadata/properties" xmlns:xsi="http://www.w3.org/2001/XMLSchema-instance" xmlns:pc="http://schemas.microsoft.com/office/infopath/2007/PartnerControls">
   <documentManagement>
     <_ip_UnifiedCompliancePolicyUIAction xmlns="http://schemas.microsoft.com/sharepoint/v3" xsi:nil="true"/>
@@ -12831,6 +14206,15 @@
     <MediaServiceKeyPoints xmlns="71af3243-3dd4-4a8d-8c0d-dd76da1f02a5" xsi:nil="true"/>
   </documentManagement>
 </p:properties>
+</file>
+
+<file path=customXml/item2.xml><?xml version="1.0" encoding="utf-8"?>
+<?mso-contentType ?>
+<FormTemplates xmlns="http://schemas.microsoft.com/sharepoint/v3/contenttype/forms">
+  <Display>DocumentLibraryForm</Display>
+  <Edit>DocumentLibraryForm</Edit>
+  <New>DocumentLibraryForm</New>
+</FormTemplates>
 </file>
 
 <file path=customXml/item3.xml><?xml version="1.0" encoding="utf-8"?>
@@ -13116,14 +14500,6 @@
 </file>
 
 <file path=customXml/itemProps1.xml><?xml version="1.0" encoding="utf-8"?>
-<ds:datastoreItem xmlns:ds="http://schemas.openxmlformats.org/officeDocument/2006/customXml" ds:itemID="{E618C13B-9D83-4AF4-B64D-33362D5133F8}">
-  <ds:schemaRefs>
-    <ds:schemaRef ds:uri="http://schemas.microsoft.com/sharepoint/v3/contenttype/forms"/>
-  </ds:schemaRefs>
-</ds:datastoreItem>
-</file>
-
-<file path=customXml/itemProps2.xml><?xml version="1.0" encoding="utf-8"?>
 <ds:datastoreItem xmlns:ds="http://schemas.openxmlformats.org/officeDocument/2006/customXml" ds:itemID="{CA4F7154-AFAC-4BE7-8A74-7F4B6FC2743C}">
   <ds:schemaRefs>
     <ds:schemaRef ds:uri="71af3243-3dd4-4a8d-8c0d-dd76da1f02a5"/>
@@ -13138,6 +14514,14 @@
     <ds:schemaRef ds:uri="http://schemas.microsoft.com/office/infopath/2007/PartnerControls"/>
     <ds:schemaRef ds:uri="http://schemas.openxmlformats.org/package/2006/metadata/core-properties"/>
     <ds:schemaRef ds:uri="http://schemas.microsoft.com/office/2006/metadata/properties"/>
+  </ds:schemaRefs>
+</ds:datastoreItem>
+</file>
+
+<file path=customXml/itemProps2.xml><?xml version="1.0" encoding="utf-8"?>
+<ds:datastoreItem xmlns:ds="http://schemas.openxmlformats.org/officeDocument/2006/customXml" ds:itemID="{E618C13B-9D83-4AF4-B64D-33362D5133F8}">
+  <ds:schemaRefs>
+    <ds:schemaRef ds:uri="http://schemas.microsoft.com/sharepoint/v3/contenttype/forms"/>
   </ds:schemaRefs>
 </ds:datastoreItem>
 </file>

</xml_diff>